<commit_message>
edited week report with dougman results on casia data set.
</commit_message>
<xml_diff>
--- a/weekly_progress/week6.pptx
+++ b/weekly_progress/week6.pptx
@@ -10,9 +10,14 @@
     <p:sldId id="257" r:id="rId5"/>
     <p:sldId id="258" r:id="rId6"/>
     <p:sldId id="259" r:id="rId7"/>
+    <p:sldId id="260" r:id="rId8"/>
+    <p:sldId id="261" r:id="rId9"/>
+    <p:sldId id="262" r:id="rId10"/>
+    <p:sldId id="263" r:id="rId11"/>
+    <p:sldId id="264" r:id="rId12"/>
   </p:sldIdLst>
   <p:sldSz cx="9144000" cy="6858000"/>
-  <p:notesSz cx="6858000" cy="9144000"/>
+  <p:notesSz cx="7559675" cy="10691812"/>
 </p:presentation>
 </file>
 
@@ -57,7 +62,7 @@
       </p:grpSpPr>
       <p:sp>
         <p:nvSpPr>
-          <p:cNvPr id="26" name="PlaceHolder 1"/>
+          <p:cNvPr id="23" name="PlaceHolder 1"/>
           <p:cNvSpPr>
             <a:spLocks noGrp="1"/>
           </p:cNvSpPr>
@@ -77,23 +82,24 @@
         <p:txBody>
           <a:bodyPr lIns="0" rIns="0" tIns="0" bIns="0" anchor="ctr"/>
           <a:p>
-            <a:endParaRPr b="0" lang="en-IN" sz="1400" spc="-1" strike="noStrike">
-              <a:solidFill>
-                <a:srgbClr val="000000"/>
-              </a:solidFill>
-              <a:uFill>
-                <a:solidFill>
-                  <a:srgbClr val="ffffff"/>
-                </a:solidFill>
-              </a:uFill>
-              <a:latin typeface="Arial"/>
-            </a:endParaRPr>
-          </a:p>
-        </p:txBody>
-      </p:sp>
-      <p:sp>
-        <p:nvSpPr>
-          <p:cNvPr id="27" name="PlaceHolder 2"/>
+            <a:pPr algn="ctr"/>
+            <a:endParaRPr b="0" lang="en-IN" sz="4400" spc="-1" strike="noStrike">
+              <a:solidFill>
+                <a:srgbClr val="000000"/>
+              </a:solidFill>
+              <a:uFill>
+                <a:solidFill>
+                  <a:srgbClr val="ffffff"/>
+                </a:solidFill>
+              </a:uFill>
+              <a:latin typeface="Arial"/>
+            </a:endParaRPr>
+          </a:p>
+        </p:txBody>
+      </p:sp>
+      <p:sp>
+        <p:nvSpPr>
+          <p:cNvPr id="24" name="PlaceHolder 2"/>
           <p:cNvSpPr>
             <a:spLocks noGrp="1"/>
           </p:cNvSpPr>
@@ -113,23 +119,23 @@
         <p:txBody>
           <a:bodyPr lIns="0" rIns="0" tIns="0" bIns="0"/>
           <a:p>
-            <a:endParaRPr b="0" lang="en-IN" sz="1400" spc="-1" strike="noStrike">
-              <a:solidFill>
-                <a:srgbClr val="000000"/>
-              </a:solidFill>
-              <a:uFill>
-                <a:solidFill>
-                  <a:srgbClr val="ffffff"/>
-                </a:solidFill>
-              </a:uFill>
-              <a:latin typeface="Arial"/>
-            </a:endParaRPr>
-          </a:p>
-        </p:txBody>
-      </p:sp>
-      <p:sp>
-        <p:nvSpPr>
-          <p:cNvPr id="28" name="PlaceHolder 3"/>
+            <a:endParaRPr b="0" lang="en-IN" sz="3200" spc="-1" strike="noStrike">
+              <a:solidFill>
+                <a:srgbClr val="000000"/>
+              </a:solidFill>
+              <a:uFill>
+                <a:solidFill>
+                  <a:srgbClr val="ffffff"/>
+                </a:solidFill>
+              </a:uFill>
+              <a:latin typeface="Arial"/>
+            </a:endParaRPr>
+          </a:p>
+        </p:txBody>
+      </p:sp>
+      <p:sp>
+        <p:nvSpPr>
+          <p:cNvPr id="25" name="PlaceHolder 3"/>
           <p:cNvSpPr>
             <a:spLocks noGrp="1"/>
           </p:cNvSpPr>
@@ -149,7 +155,7 @@
         <p:txBody>
           <a:bodyPr lIns="0" rIns="0" tIns="0" bIns="0"/>
           <a:p>
-            <a:endParaRPr b="0" lang="en-IN" sz="1400" spc="-1" strike="noStrike">
+            <a:endParaRPr b="0" lang="en-IN" sz="3200" spc="-1" strike="noStrike">
               <a:solidFill>
                 <a:srgbClr val="000000"/>
               </a:solidFill>
@@ -187,7 +193,7 @@
       </p:grpSpPr>
       <p:sp>
         <p:nvSpPr>
-          <p:cNvPr id="29" name="PlaceHolder 1"/>
+          <p:cNvPr id="26" name="PlaceHolder 1"/>
           <p:cNvSpPr>
             <a:spLocks noGrp="1"/>
           </p:cNvSpPr>
@@ -207,23 +213,24 @@
         <p:txBody>
           <a:bodyPr lIns="0" rIns="0" tIns="0" bIns="0" anchor="ctr"/>
           <a:p>
-            <a:endParaRPr b="0" lang="en-IN" sz="1400" spc="-1" strike="noStrike">
-              <a:solidFill>
-                <a:srgbClr val="000000"/>
-              </a:solidFill>
-              <a:uFill>
-                <a:solidFill>
-                  <a:srgbClr val="ffffff"/>
-                </a:solidFill>
-              </a:uFill>
-              <a:latin typeface="Arial"/>
-            </a:endParaRPr>
-          </a:p>
-        </p:txBody>
-      </p:sp>
-      <p:sp>
-        <p:nvSpPr>
-          <p:cNvPr id="30" name="PlaceHolder 2"/>
+            <a:pPr algn="ctr"/>
+            <a:endParaRPr b="0" lang="en-IN" sz="4400" spc="-1" strike="noStrike">
+              <a:solidFill>
+                <a:srgbClr val="000000"/>
+              </a:solidFill>
+              <a:uFill>
+                <a:solidFill>
+                  <a:srgbClr val="ffffff"/>
+                </a:solidFill>
+              </a:uFill>
+              <a:latin typeface="Arial"/>
+            </a:endParaRPr>
+          </a:p>
+        </p:txBody>
+      </p:sp>
+      <p:sp>
+        <p:nvSpPr>
+          <p:cNvPr id="27" name="PlaceHolder 2"/>
           <p:cNvSpPr>
             <a:spLocks noGrp="1"/>
           </p:cNvSpPr>
@@ -243,23 +250,23 @@
         <p:txBody>
           <a:bodyPr lIns="0" rIns="0" tIns="0" bIns="0"/>
           <a:p>
-            <a:endParaRPr b="0" lang="en-IN" sz="1400" spc="-1" strike="noStrike">
-              <a:solidFill>
-                <a:srgbClr val="000000"/>
-              </a:solidFill>
-              <a:uFill>
-                <a:solidFill>
-                  <a:srgbClr val="ffffff"/>
-                </a:solidFill>
-              </a:uFill>
-              <a:latin typeface="Arial"/>
-            </a:endParaRPr>
-          </a:p>
-        </p:txBody>
-      </p:sp>
-      <p:sp>
-        <p:nvSpPr>
-          <p:cNvPr id="31" name="PlaceHolder 3"/>
+            <a:endParaRPr b="0" lang="en-IN" sz="3200" spc="-1" strike="noStrike">
+              <a:solidFill>
+                <a:srgbClr val="000000"/>
+              </a:solidFill>
+              <a:uFill>
+                <a:solidFill>
+                  <a:srgbClr val="ffffff"/>
+                </a:solidFill>
+              </a:uFill>
+              <a:latin typeface="Arial"/>
+            </a:endParaRPr>
+          </a:p>
+        </p:txBody>
+      </p:sp>
+      <p:sp>
+        <p:nvSpPr>
+          <p:cNvPr id="28" name="PlaceHolder 3"/>
           <p:cNvSpPr>
             <a:spLocks noGrp="1"/>
           </p:cNvSpPr>
@@ -279,23 +286,23 @@
         <p:txBody>
           <a:bodyPr lIns="0" rIns="0" tIns="0" bIns="0"/>
           <a:p>
-            <a:endParaRPr b="0" lang="en-IN" sz="1400" spc="-1" strike="noStrike">
-              <a:solidFill>
-                <a:srgbClr val="000000"/>
-              </a:solidFill>
-              <a:uFill>
-                <a:solidFill>
-                  <a:srgbClr val="ffffff"/>
-                </a:solidFill>
-              </a:uFill>
-              <a:latin typeface="Arial"/>
-            </a:endParaRPr>
-          </a:p>
-        </p:txBody>
-      </p:sp>
-      <p:sp>
-        <p:nvSpPr>
-          <p:cNvPr id="32" name="PlaceHolder 4"/>
+            <a:endParaRPr b="0" lang="en-IN" sz="3200" spc="-1" strike="noStrike">
+              <a:solidFill>
+                <a:srgbClr val="000000"/>
+              </a:solidFill>
+              <a:uFill>
+                <a:solidFill>
+                  <a:srgbClr val="ffffff"/>
+                </a:solidFill>
+              </a:uFill>
+              <a:latin typeface="Arial"/>
+            </a:endParaRPr>
+          </a:p>
+        </p:txBody>
+      </p:sp>
+      <p:sp>
+        <p:nvSpPr>
+          <p:cNvPr id="29" name="PlaceHolder 4"/>
           <p:cNvSpPr>
             <a:spLocks noGrp="1"/>
           </p:cNvSpPr>
@@ -315,23 +322,23 @@
         <p:txBody>
           <a:bodyPr lIns="0" rIns="0" tIns="0" bIns="0"/>
           <a:p>
-            <a:endParaRPr b="0" lang="en-IN" sz="1400" spc="-1" strike="noStrike">
-              <a:solidFill>
-                <a:srgbClr val="000000"/>
-              </a:solidFill>
-              <a:uFill>
-                <a:solidFill>
-                  <a:srgbClr val="ffffff"/>
-                </a:solidFill>
-              </a:uFill>
-              <a:latin typeface="Arial"/>
-            </a:endParaRPr>
-          </a:p>
-        </p:txBody>
-      </p:sp>
-      <p:sp>
-        <p:nvSpPr>
-          <p:cNvPr id="33" name="PlaceHolder 5"/>
+            <a:endParaRPr b="0" lang="en-IN" sz="3200" spc="-1" strike="noStrike">
+              <a:solidFill>
+                <a:srgbClr val="000000"/>
+              </a:solidFill>
+              <a:uFill>
+                <a:solidFill>
+                  <a:srgbClr val="ffffff"/>
+                </a:solidFill>
+              </a:uFill>
+              <a:latin typeface="Arial"/>
+            </a:endParaRPr>
+          </a:p>
+        </p:txBody>
+      </p:sp>
+      <p:sp>
+        <p:nvSpPr>
+          <p:cNvPr id="30" name="PlaceHolder 5"/>
           <p:cNvSpPr>
             <a:spLocks noGrp="1"/>
           </p:cNvSpPr>
@@ -351,7 +358,7 @@
         <p:txBody>
           <a:bodyPr lIns="0" rIns="0" tIns="0" bIns="0"/>
           <a:p>
-            <a:endParaRPr b="0" lang="en-IN" sz="1400" spc="-1" strike="noStrike">
+            <a:endParaRPr b="0" lang="en-IN" sz="3200" spc="-1" strike="noStrike">
               <a:solidFill>
                 <a:srgbClr val="000000"/>
               </a:solidFill>
@@ -389,7 +396,7 @@
       </p:grpSpPr>
       <p:sp>
         <p:nvSpPr>
-          <p:cNvPr id="34" name="PlaceHolder 1"/>
+          <p:cNvPr id="31" name="PlaceHolder 1"/>
           <p:cNvSpPr>
             <a:spLocks noGrp="1"/>
           </p:cNvSpPr>
@@ -409,23 +416,24 @@
         <p:txBody>
           <a:bodyPr lIns="0" rIns="0" tIns="0" bIns="0" anchor="ctr"/>
           <a:p>
-            <a:endParaRPr b="0" lang="en-IN" sz="1400" spc="-1" strike="noStrike">
-              <a:solidFill>
-                <a:srgbClr val="000000"/>
-              </a:solidFill>
-              <a:uFill>
-                <a:solidFill>
-                  <a:srgbClr val="ffffff"/>
-                </a:solidFill>
-              </a:uFill>
-              <a:latin typeface="Arial"/>
-            </a:endParaRPr>
-          </a:p>
-        </p:txBody>
-      </p:sp>
-      <p:sp>
-        <p:nvSpPr>
-          <p:cNvPr id="35" name="PlaceHolder 2"/>
+            <a:pPr algn="ctr"/>
+            <a:endParaRPr b="0" lang="en-IN" sz="4400" spc="-1" strike="noStrike">
+              <a:solidFill>
+                <a:srgbClr val="000000"/>
+              </a:solidFill>
+              <a:uFill>
+                <a:solidFill>
+                  <a:srgbClr val="ffffff"/>
+                </a:solidFill>
+              </a:uFill>
+              <a:latin typeface="Arial"/>
+            </a:endParaRPr>
+          </a:p>
+        </p:txBody>
+      </p:sp>
+      <p:sp>
+        <p:nvSpPr>
+          <p:cNvPr id="32" name="PlaceHolder 2"/>
           <p:cNvSpPr>
             <a:spLocks noGrp="1"/>
           </p:cNvSpPr>
@@ -445,23 +453,23 @@
         <p:txBody>
           <a:bodyPr lIns="0" rIns="0" tIns="0" bIns="0"/>
           <a:p>
-            <a:endParaRPr b="0" lang="en-IN" sz="1400" spc="-1" strike="noStrike">
-              <a:solidFill>
-                <a:srgbClr val="000000"/>
-              </a:solidFill>
-              <a:uFill>
-                <a:solidFill>
-                  <a:srgbClr val="ffffff"/>
-                </a:solidFill>
-              </a:uFill>
-              <a:latin typeface="Arial"/>
-            </a:endParaRPr>
-          </a:p>
-        </p:txBody>
-      </p:sp>
-      <p:sp>
-        <p:nvSpPr>
-          <p:cNvPr id="36" name="PlaceHolder 3"/>
+            <a:endParaRPr b="0" lang="en-IN" sz="3200" spc="-1" strike="noStrike">
+              <a:solidFill>
+                <a:srgbClr val="000000"/>
+              </a:solidFill>
+              <a:uFill>
+                <a:solidFill>
+                  <a:srgbClr val="ffffff"/>
+                </a:solidFill>
+              </a:uFill>
+              <a:latin typeface="Arial"/>
+            </a:endParaRPr>
+          </a:p>
+        </p:txBody>
+      </p:sp>
+      <p:sp>
+        <p:nvSpPr>
+          <p:cNvPr id="33" name="PlaceHolder 3"/>
           <p:cNvSpPr>
             <a:spLocks noGrp="1"/>
           </p:cNvSpPr>
@@ -481,7 +489,7 @@
         <p:txBody>
           <a:bodyPr lIns="0" rIns="0" tIns="0" bIns="0"/>
           <a:p>
-            <a:endParaRPr b="0" lang="en-IN" sz="1400" spc="-1" strike="noStrike">
+            <a:endParaRPr b="0" lang="en-IN" sz="3200" spc="-1" strike="noStrike">
               <a:solidFill>
                 <a:srgbClr val="000000"/>
               </a:solidFill>
@@ -497,7 +505,7 @@
       </p:sp>
       <p:pic>
         <p:nvPicPr>
-          <p:cNvPr id="37" name="" descr=""/>
+          <p:cNvPr id="34" name="" descr=""/>
           <p:cNvPicPr/>
           <p:nvPr/>
         </p:nvPicPr>
@@ -520,7 +528,7 @@
       </p:pic>
       <p:pic>
         <p:nvPicPr>
-          <p:cNvPr id="38" name="" descr=""/>
+          <p:cNvPr id="35" name="" descr=""/>
           <p:cNvPicPr/>
           <p:nvPr/>
         </p:nvPicPr>
@@ -587,7 +595,7 @@
       </p:grpSpPr>
       <p:sp>
         <p:nvSpPr>
-          <p:cNvPr id="44" name="PlaceHolder 1"/>
+          <p:cNvPr id="38" name="PlaceHolder 1"/>
           <p:cNvSpPr>
             <a:spLocks noGrp="1"/>
           </p:cNvSpPr>
@@ -607,23 +615,24 @@
         <p:txBody>
           <a:bodyPr lIns="0" rIns="0" tIns="0" bIns="0" anchor="ctr"/>
           <a:p>
-            <a:endParaRPr b="0" lang="en-IN" sz="1400" spc="-1" strike="noStrike">
-              <a:solidFill>
-                <a:srgbClr val="000000"/>
-              </a:solidFill>
-              <a:uFill>
-                <a:solidFill>
-                  <a:srgbClr val="ffffff"/>
-                </a:solidFill>
-              </a:uFill>
-              <a:latin typeface="Arial"/>
-            </a:endParaRPr>
-          </a:p>
-        </p:txBody>
-      </p:sp>
-      <p:sp>
-        <p:nvSpPr>
-          <p:cNvPr id="45" name="PlaceHolder 2"/>
+            <a:pPr algn="ctr"/>
+            <a:endParaRPr b="0" lang="en-IN" sz="4400" spc="-1" strike="noStrike">
+              <a:solidFill>
+                <a:srgbClr val="000000"/>
+              </a:solidFill>
+              <a:uFill>
+                <a:solidFill>
+                  <a:srgbClr val="ffffff"/>
+                </a:solidFill>
+              </a:uFill>
+              <a:latin typeface="Arial"/>
+            </a:endParaRPr>
+          </a:p>
+        </p:txBody>
+      </p:sp>
+      <p:sp>
+        <p:nvSpPr>
+          <p:cNvPr id="39" name="PlaceHolder 2"/>
           <p:cNvSpPr>
             <a:spLocks noGrp="1"/>
           </p:cNvSpPr>
@@ -682,7 +691,7 @@
       </p:grpSpPr>
       <p:sp>
         <p:nvSpPr>
-          <p:cNvPr id="46" name="PlaceHolder 1"/>
+          <p:cNvPr id="40" name="PlaceHolder 1"/>
           <p:cNvSpPr>
             <a:spLocks noGrp="1"/>
           </p:cNvSpPr>
@@ -702,23 +711,24 @@
         <p:txBody>
           <a:bodyPr lIns="0" rIns="0" tIns="0" bIns="0" anchor="ctr"/>
           <a:p>
-            <a:endParaRPr b="0" lang="en-IN" sz="1400" spc="-1" strike="noStrike">
-              <a:solidFill>
-                <a:srgbClr val="000000"/>
-              </a:solidFill>
-              <a:uFill>
-                <a:solidFill>
-                  <a:srgbClr val="ffffff"/>
-                </a:solidFill>
-              </a:uFill>
-              <a:latin typeface="Arial"/>
-            </a:endParaRPr>
-          </a:p>
-        </p:txBody>
-      </p:sp>
-      <p:sp>
-        <p:nvSpPr>
-          <p:cNvPr id="47" name="PlaceHolder 2"/>
+            <a:pPr algn="ctr"/>
+            <a:endParaRPr b="0" lang="en-IN" sz="4400" spc="-1" strike="noStrike">
+              <a:solidFill>
+                <a:srgbClr val="000000"/>
+              </a:solidFill>
+              <a:uFill>
+                <a:solidFill>
+                  <a:srgbClr val="ffffff"/>
+                </a:solidFill>
+              </a:uFill>
+              <a:latin typeface="Arial"/>
+            </a:endParaRPr>
+          </a:p>
+        </p:txBody>
+      </p:sp>
+      <p:sp>
+        <p:nvSpPr>
+          <p:cNvPr id="41" name="PlaceHolder 2"/>
           <p:cNvSpPr>
             <a:spLocks noGrp="1"/>
           </p:cNvSpPr>
@@ -738,7 +748,7 @@
         <p:txBody>
           <a:bodyPr lIns="0" rIns="0" tIns="0" bIns="0"/>
           <a:p>
-            <a:endParaRPr b="0" lang="en-IN" sz="1400" spc="-1" strike="noStrike">
+            <a:endParaRPr b="0" lang="en-IN" sz="3200" spc="-1" strike="noStrike">
               <a:solidFill>
                 <a:srgbClr val="000000"/>
               </a:solidFill>
@@ -776,7 +786,7 @@
       </p:grpSpPr>
       <p:sp>
         <p:nvSpPr>
-          <p:cNvPr id="48" name="PlaceHolder 1"/>
+          <p:cNvPr id="42" name="PlaceHolder 1"/>
           <p:cNvSpPr>
             <a:spLocks noGrp="1"/>
           </p:cNvSpPr>
@@ -796,23 +806,24 @@
         <p:txBody>
           <a:bodyPr lIns="0" rIns="0" tIns="0" bIns="0" anchor="ctr"/>
           <a:p>
-            <a:endParaRPr b="0" lang="en-IN" sz="1400" spc="-1" strike="noStrike">
-              <a:solidFill>
-                <a:srgbClr val="000000"/>
-              </a:solidFill>
-              <a:uFill>
-                <a:solidFill>
-                  <a:srgbClr val="ffffff"/>
-                </a:solidFill>
-              </a:uFill>
-              <a:latin typeface="Arial"/>
-            </a:endParaRPr>
-          </a:p>
-        </p:txBody>
-      </p:sp>
-      <p:sp>
-        <p:nvSpPr>
-          <p:cNvPr id="49" name="PlaceHolder 2"/>
+            <a:pPr algn="ctr"/>
+            <a:endParaRPr b="0" lang="en-IN" sz="4400" spc="-1" strike="noStrike">
+              <a:solidFill>
+                <a:srgbClr val="000000"/>
+              </a:solidFill>
+              <a:uFill>
+                <a:solidFill>
+                  <a:srgbClr val="ffffff"/>
+                </a:solidFill>
+              </a:uFill>
+              <a:latin typeface="Arial"/>
+            </a:endParaRPr>
+          </a:p>
+        </p:txBody>
+      </p:sp>
+      <p:sp>
+        <p:nvSpPr>
+          <p:cNvPr id="43" name="PlaceHolder 2"/>
           <p:cNvSpPr>
             <a:spLocks noGrp="1"/>
           </p:cNvSpPr>
@@ -832,23 +843,23 @@
         <p:txBody>
           <a:bodyPr lIns="0" rIns="0" tIns="0" bIns="0"/>
           <a:p>
-            <a:endParaRPr b="0" lang="en-IN" sz="1400" spc="-1" strike="noStrike">
-              <a:solidFill>
-                <a:srgbClr val="000000"/>
-              </a:solidFill>
-              <a:uFill>
-                <a:solidFill>
-                  <a:srgbClr val="ffffff"/>
-                </a:solidFill>
-              </a:uFill>
-              <a:latin typeface="Arial"/>
-            </a:endParaRPr>
-          </a:p>
-        </p:txBody>
-      </p:sp>
-      <p:sp>
-        <p:nvSpPr>
-          <p:cNvPr id="50" name="PlaceHolder 3"/>
+            <a:endParaRPr b="0" lang="en-IN" sz="3200" spc="-1" strike="noStrike">
+              <a:solidFill>
+                <a:srgbClr val="000000"/>
+              </a:solidFill>
+              <a:uFill>
+                <a:solidFill>
+                  <a:srgbClr val="ffffff"/>
+                </a:solidFill>
+              </a:uFill>
+              <a:latin typeface="Arial"/>
+            </a:endParaRPr>
+          </a:p>
+        </p:txBody>
+      </p:sp>
+      <p:sp>
+        <p:nvSpPr>
+          <p:cNvPr id="44" name="PlaceHolder 3"/>
           <p:cNvSpPr>
             <a:spLocks noGrp="1"/>
           </p:cNvSpPr>
@@ -868,7 +879,7 @@
         <p:txBody>
           <a:bodyPr lIns="0" rIns="0" tIns="0" bIns="0"/>
           <a:p>
-            <a:endParaRPr b="0" lang="en-IN" sz="1400" spc="-1" strike="noStrike">
+            <a:endParaRPr b="0" lang="en-IN" sz="3200" spc="-1" strike="noStrike">
               <a:solidFill>
                 <a:srgbClr val="000000"/>
               </a:solidFill>
@@ -906,7 +917,7 @@
       </p:grpSpPr>
       <p:sp>
         <p:nvSpPr>
-          <p:cNvPr id="51" name="PlaceHolder 1"/>
+          <p:cNvPr id="45" name="PlaceHolder 1"/>
           <p:cNvSpPr>
             <a:spLocks noGrp="1"/>
           </p:cNvSpPr>
@@ -926,7 +937,8 @@
         <p:txBody>
           <a:bodyPr lIns="0" rIns="0" tIns="0" bIns="0" anchor="ctr"/>
           <a:p>
-            <a:endParaRPr b="0" lang="en-IN" sz="1400" spc="-1" strike="noStrike">
+            <a:pPr algn="ctr"/>
+            <a:endParaRPr b="0" lang="en-IN" sz="4400" spc="-1" strike="noStrike">
               <a:solidFill>
                 <a:srgbClr val="000000"/>
               </a:solidFill>
@@ -964,7 +976,7 @@
       </p:grpSpPr>
       <p:sp>
         <p:nvSpPr>
-          <p:cNvPr id="52" name="PlaceHolder 1"/>
+          <p:cNvPr id="46" name="PlaceHolder 1"/>
           <p:cNvSpPr>
             <a:spLocks noGrp="1"/>
           </p:cNvSpPr>
@@ -1023,7 +1035,7 @@
       </p:grpSpPr>
       <p:sp>
         <p:nvSpPr>
-          <p:cNvPr id="53" name="PlaceHolder 1"/>
+          <p:cNvPr id="47" name="PlaceHolder 1"/>
           <p:cNvSpPr>
             <a:spLocks noGrp="1"/>
           </p:cNvSpPr>
@@ -1043,23 +1055,24 @@
         <p:txBody>
           <a:bodyPr lIns="0" rIns="0" tIns="0" bIns="0" anchor="ctr"/>
           <a:p>
-            <a:endParaRPr b="0" lang="en-IN" sz="1400" spc="-1" strike="noStrike">
-              <a:solidFill>
-                <a:srgbClr val="000000"/>
-              </a:solidFill>
-              <a:uFill>
-                <a:solidFill>
-                  <a:srgbClr val="ffffff"/>
-                </a:solidFill>
-              </a:uFill>
-              <a:latin typeface="Arial"/>
-            </a:endParaRPr>
-          </a:p>
-        </p:txBody>
-      </p:sp>
-      <p:sp>
-        <p:nvSpPr>
-          <p:cNvPr id="54" name="PlaceHolder 2"/>
+            <a:pPr algn="ctr"/>
+            <a:endParaRPr b="0" lang="en-IN" sz="4400" spc="-1" strike="noStrike">
+              <a:solidFill>
+                <a:srgbClr val="000000"/>
+              </a:solidFill>
+              <a:uFill>
+                <a:solidFill>
+                  <a:srgbClr val="ffffff"/>
+                </a:solidFill>
+              </a:uFill>
+              <a:latin typeface="Arial"/>
+            </a:endParaRPr>
+          </a:p>
+        </p:txBody>
+      </p:sp>
+      <p:sp>
+        <p:nvSpPr>
+          <p:cNvPr id="48" name="PlaceHolder 2"/>
           <p:cNvSpPr>
             <a:spLocks noGrp="1"/>
           </p:cNvSpPr>
@@ -1079,23 +1092,23 @@
         <p:txBody>
           <a:bodyPr lIns="0" rIns="0" tIns="0" bIns="0"/>
           <a:p>
-            <a:endParaRPr b="0" lang="en-IN" sz="1400" spc="-1" strike="noStrike">
-              <a:solidFill>
-                <a:srgbClr val="000000"/>
-              </a:solidFill>
-              <a:uFill>
-                <a:solidFill>
-                  <a:srgbClr val="ffffff"/>
-                </a:solidFill>
-              </a:uFill>
-              <a:latin typeface="Arial"/>
-            </a:endParaRPr>
-          </a:p>
-        </p:txBody>
-      </p:sp>
-      <p:sp>
-        <p:nvSpPr>
-          <p:cNvPr id="55" name="PlaceHolder 3"/>
+            <a:endParaRPr b="0" lang="en-IN" sz="3200" spc="-1" strike="noStrike">
+              <a:solidFill>
+                <a:srgbClr val="000000"/>
+              </a:solidFill>
+              <a:uFill>
+                <a:solidFill>
+                  <a:srgbClr val="ffffff"/>
+                </a:solidFill>
+              </a:uFill>
+              <a:latin typeface="Arial"/>
+            </a:endParaRPr>
+          </a:p>
+        </p:txBody>
+      </p:sp>
+      <p:sp>
+        <p:nvSpPr>
+          <p:cNvPr id="49" name="PlaceHolder 3"/>
           <p:cNvSpPr>
             <a:spLocks noGrp="1"/>
           </p:cNvSpPr>
@@ -1115,23 +1128,23 @@
         <p:txBody>
           <a:bodyPr lIns="0" rIns="0" tIns="0" bIns="0"/>
           <a:p>
-            <a:endParaRPr b="0" lang="en-IN" sz="1400" spc="-1" strike="noStrike">
-              <a:solidFill>
-                <a:srgbClr val="000000"/>
-              </a:solidFill>
-              <a:uFill>
-                <a:solidFill>
-                  <a:srgbClr val="ffffff"/>
-                </a:solidFill>
-              </a:uFill>
-              <a:latin typeface="Arial"/>
-            </a:endParaRPr>
-          </a:p>
-        </p:txBody>
-      </p:sp>
-      <p:sp>
-        <p:nvSpPr>
-          <p:cNvPr id="56" name="PlaceHolder 4"/>
+            <a:endParaRPr b="0" lang="en-IN" sz="3200" spc="-1" strike="noStrike">
+              <a:solidFill>
+                <a:srgbClr val="000000"/>
+              </a:solidFill>
+              <a:uFill>
+                <a:solidFill>
+                  <a:srgbClr val="ffffff"/>
+                </a:solidFill>
+              </a:uFill>
+              <a:latin typeface="Arial"/>
+            </a:endParaRPr>
+          </a:p>
+        </p:txBody>
+      </p:sp>
+      <p:sp>
+        <p:nvSpPr>
+          <p:cNvPr id="50" name="PlaceHolder 4"/>
           <p:cNvSpPr>
             <a:spLocks noGrp="1"/>
           </p:cNvSpPr>
@@ -1151,7 +1164,7 @@
         <p:txBody>
           <a:bodyPr lIns="0" rIns="0" tIns="0" bIns="0"/>
           <a:p>
-            <a:endParaRPr b="0" lang="en-IN" sz="1400" spc="-1" strike="noStrike">
+            <a:endParaRPr b="0" lang="en-IN" sz="3200" spc="-1" strike="noStrike">
               <a:solidFill>
                 <a:srgbClr val="000000"/>
               </a:solidFill>
@@ -1189,7 +1202,7 @@
       </p:grpSpPr>
       <p:sp>
         <p:nvSpPr>
-          <p:cNvPr id="5" name="PlaceHolder 1"/>
+          <p:cNvPr id="2" name="PlaceHolder 1"/>
           <p:cNvSpPr>
             <a:spLocks noGrp="1"/>
           </p:cNvSpPr>
@@ -1209,23 +1222,24 @@
         <p:txBody>
           <a:bodyPr lIns="0" rIns="0" tIns="0" bIns="0" anchor="ctr"/>
           <a:p>
-            <a:endParaRPr b="0" lang="en-IN" sz="1400" spc="-1" strike="noStrike">
-              <a:solidFill>
-                <a:srgbClr val="000000"/>
-              </a:solidFill>
-              <a:uFill>
-                <a:solidFill>
-                  <a:srgbClr val="ffffff"/>
-                </a:solidFill>
-              </a:uFill>
-              <a:latin typeface="Arial"/>
-            </a:endParaRPr>
-          </a:p>
-        </p:txBody>
-      </p:sp>
-      <p:sp>
-        <p:nvSpPr>
-          <p:cNvPr id="6" name="PlaceHolder 2"/>
+            <a:pPr algn="ctr"/>
+            <a:endParaRPr b="0" lang="en-IN" sz="4400" spc="-1" strike="noStrike">
+              <a:solidFill>
+                <a:srgbClr val="000000"/>
+              </a:solidFill>
+              <a:uFill>
+                <a:solidFill>
+                  <a:srgbClr val="ffffff"/>
+                </a:solidFill>
+              </a:uFill>
+              <a:latin typeface="Arial"/>
+            </a:endParaRPr>
+          </a:p>
+        </p:txBody>
+      </p:sp>
+      <p:sp>
+        <p:nvSpPr>
+          <p:cNvPr id="3" name="PlaceHolder 2"/>
           <p:cNvSpPr>
             <a:spLocks noGrp="1"/>
           </p:cNvSpPr>
@@ -1284,7 +1298,7 @@
       </p:grpSpPr>
       <p:sp>
         <p:nvSpPr>
-          <p:cNvPr id="57" name="PlaceHolder 1"/>
+          <p:cNvPr id="51" name="PlaceHolder 1"/>
           <p:cNvSpPr>
             <a:spLocks noGrp="1"/>
           </p:cNvSpPr>
@@ -1304,23 +1318,24 @@
         <p:txBody>
           <a:bodyPr lIns="0" rIns="0" tIns="0" bIns="0" anchor="ctr"/>
           <a:p>
-            <a:endParaRPr b="0" lang="en-IN" sz="1400" spc="-1" strike="noStrike">
-              <a:solidFill>
-                <a:srgbClr val="000000"/>
-              </a:solidFill>
-              <a:uFill>
-                <a:solidFill>
-                  <a:srgbClr val="ffffff"/>
-                </a:solidFill>
-              </a:uFill>
-              <a:latin typeface="Arial"/>
-            </a:endParaRPr>
-          </a:p>
-        </p:txBody>
-      </p:sp>
-      <p:sp>
-        <p:nvSpPr>
-          <p:cNvPr id="58" name="PlaceHolder 2"/>
+            <a:pPr algn="ctr"/>
+            <a:endParaRPr b="0" lang="en-IN" sz="4400" spc="-1" strike="noStrike">
+              <a:solidFill>
+                <a:srgbClr val="000000"/>
+              </a:solidFill>
+              <a:uFill>
+                <a:solidFill>
+                  <a:srgbClr val="ffffff"/>
+                </a:solidFill>
+              </a:uFill>
+              <a:latin typeface="Arial"/>
+            </a:endParaRPr>
+          </a:p>
+        </p:txBody>
+      </p:sp>
+      <p:sp>
+        <p:nvSpPr>
+          <p:cNvPr id="52" name="PlaceHolder 2"/>
           <p:cNvSpPr>
             <a:spLocks noGrp="1"/>
           </p:cNvSpPr>
@@ -1340,23 +1355,23 @@
         <p:txBody>
           <a:bodyPr lIns="0" rIns="0" tIns="0" bIns="0"/>
           <a:p>
-            <a:endParaRPr b="0" lang="en-IN" sz="1400" spc="-1" strike="noStrike">
-              <a:solidFill>
-                <a:srgbClr val="000000"/>
-              </a:solidFill>
-              <a:uFill>
-                <a:solidFill>
-                  <a:srgbClr val="ffffff"/>
-                </a:solidFill>
-              </a:uFill>
-              <a:latin typeface="Arial"/>
-            </a:endParaRPr>
-          </a:p>
-        </p:txBody>
-      </p:sp>
-      <p:sp>
-        <p:nvSpPr>
-          <p:cNvPr id="59" name="PlaceHolder 3"/>
+            <a:endParaRPr b="0" lang="en-IN" sz="3200" spc="-1" strike="noStrike">
+              <a:solidFill>
+                <a:srgbClr val="000000"/>
+              </a:solidFill>
+              <a:uFill>
+                <a:solidFill>
+                  <a:srgbClr val="ffffff"/>
+                </a:solidFill>
+              </a:uFill>
+              <a:latin typeface="Arial"/>
+            </a:endParaRPr>
+          </a:p>
+        </p:txBody>
+      </p:sp>
+      <p:sp>
+        <p:nvSpPr>
+          <p:cNvPr id="53" name="PlaceHolder 3"/>
           <p:cNvSpPr>
             <a:spLocks noGrp="1"/>
           </p:cNvSpPr>
@@ -1376,23 +1391,23 @@
         <p:txBody>
           <a:bodyPr lIns="0" rIns="0" tIns="0" bIns="0"/>
           <a:p>
-            <a:endParaRPr b="0" lang="en-IN" sz="1400" spc="-1" strike="noStrike">
-              <a:solidFill>
-                <a:srgbClr val="000000"/>
-              </a:solidFill>
-              <a:uFill>
-                <a:solidFill>
-                  <a:srgbClr val="ffffff"/>
-                </a:solidFill>
-              </a:uFill>
-              <a:latin typeface="Arial"/>
-            </a:endParaRPr>
-          </a:p>
-        </p:txBody>
-      </p:sp>
-      <p:sp>
-        <p:nvSpPr>
-          <p:cNvPr id="60" name="PlaceHolder 4"/>
+            <a:endParaRPr b="0" lang="en-IN" sz="3200" spc="-1" strike="noStrike">
+              <a:solidFill>
+                <a:srgbClr val="000000"/>
+              </a:solidFill>
+              <a:uFill>
+                <a:solidFill>
+                  <a:srgbClr val="ffffff"/>
+                </a:solidFill>
+              </a:uFill>
+              <a:latin typeface="Arial"/>
+            </a:endParaRPr>
+          </a:p>
+        </p:txBody>
+      </p:sp>
+      <p:sp>
+        <p:nvSpPr>
+          <p:cNvPr id="54" name="PlaceHolder 4"/>
           <p:cNvSpPr>
             <a:spLocks noGrp="1"/>
           </p:cNvSpPr>
@@ -1412,7 +1427,7 @@
         <p:txBody>
           <a:bodyPr lIns="0" rIns="0" tIns="0" bIns="0"/>
           <a:p>
-            <a:endParaRPr b="0" lang="en-IN" sz="1400" spc="-1" strike="noStrike">
+            <a:endParaRPr b="0" lang="en-IN" sz="3200" spc="-1" strike="noStrike">
               <a:solidFill>
                 <a:srgbClr val="000000"/>
               </a:solidFill>
@@ -1450,7 +1465,7 @@
       </p:grpSpPr>
       <p:sp>
         <p:nvSpPr>
-          <p:cNvPr id="61" name="PlaceHolder 1"/>
+          <p:cNvPr id="55" name="PlaceHolder 1"/>
           <p:cNvSpPr>
             <a:spLocks noGrp="1"/>
           </p:cNvSpPr>
@@ -1470,23 +1485,24 @@
         <p:txBody>
           <a:bodyPr lIns="0" rIns="0" tIns="0" bIns="0" anchor="ctr"/>
           <a:p>
-            <a:endParaRPr b="0" lang="en-IN" sz="1400" spc="-1" strike="noStrike">
-              <a:solidFill>
-                <a:srgbClr val="000000"/>
-              </a:solidFill>
-              <a:uFill>
-                <a:solidFill>
-                  <a:srgbClr val="ffffff"/>
-                </a:solidFill>
-              </a:uFill>
-              <a:latin typeface="Arial"/>
-            </a:endParaRPr>
-          </a:p>
-        </p:txBody>
-      </p:sp>
-      <p:sp>
-        <p:nvSpPr>
-          <p:cNvPr id="62" name="PlaceHolder 2"/>
+            <a:pPr algn="ctr"/>
+            <a:endParaRPr b="0" lang="en-IN" sz="4400" spc="-1" strike="noStrike">
+              <a:solidFill>
+                <a:srgbClr val="000000"/>
+              </a:solidFill>
+              <a:uFill>
+                <a:solidFill>
+                  <a:srgbClr val="ffffff"/>
+                </a:solidFill>
+              </a:uFill>
+              <a:latin typeface="Arial"/>
+            </a:endParaRPr>
+          </a:p>
+        </p:txBody>
+      </p:sp>
+      <p:sp>
+        <p:nvSpPr>
+          <p:cNvPr id="56" name="PlaceHolder 2"/>
           <p:cNvSpPr>
             <a:spLocks noGrp="1"/>
           </p:cNvSpPr>
@@ -1506,23 +1522,23 @@
         <p:txBody>
           <a:bodyPr lIns="0" rIns="0" tIns="0" bIns="0"/>
           <a:p>
-            <a:endParaRPr b="0" lang="en-IN" sz="1400" spc="-1" strike="noStrike">
-              <a:solidFill>
-                <a:srgbClr val="000000"/>
-              </a:solidFill>
-              <a:uFill>
-                <a:solidFill>
-                  <a:srgbClr val="ffffff"/>
-                </a:solidFill>
-              </a:uFill>
-              <a:latin typeface="Arial"/>
-            </a:endParaRPr>
-          </a:p>
-        </p:txBody>
-      </p:sp>
-      <p:sp>
-        <p:nvSpPr>
-          <p:cNvPr id="63" name="PlaceHolder 3"/>
+            <a:endParaRPr b="0" lang="en-IN" sz="3200" spc="-1" strike="noStrike">
+              <a:solidFill>
+                <a:srgbClr val="000000"/>
+              </a:solidFill>
+              <a:uFill>
+                <a:solidFill>
+                  <a:srgbClr val="ffffff"/>
+                </a:solidFill>
+              </a:uFill>
+              <a:latin typeface="Arial"/>
+            </a:endParaRPr>
+          </a:p>
+        </p:txBody>
+      </p:sp>
+      <p:sp>
+        <p:nvSpPr>
+          <p:cNvPr id="57" name="PlaceHolder 3"/>
           <p:cNvSpPr>
             <a:spLocks noGrp="1"/>
           </p:cNvSpPr>
@@ -1542,23 +1558,23 @@
         <p:txBody>
           <a:bodyPr lIns="0" rIns="0" tIns="0" bIns="0"/>
           <a:p>
-            <a:endParaRPr b="0" lang="en-IN" sz="1400" spc="-1" strike="noStrike">
-              <a:solidFill>
-                <a:srgbClr val="000000"/>
-              </a:solidFill>
-              <a:uFill>
-                <a:solidFill>
-                  <a:srgbClr val="ffffff"/>
-                </a:solidFill>
-              </a:uFill>
-              <a:latin typeface="Arial"/>
-            </a:endParaRPr>
-          </a:p>
-        </p:txBody>
-      </p:sp>
-      <p:sp>
-        <p:nvSpPr>
-          <p:cNvPr id="64" name="PlaceHolder 4"/>
+            <a:endParaRPr b="0" lang="en-IN" sz="3200" spc="-1" strike="noStrike">
+              <a:solidFill>
+                <a:srgbClr val="000000"/>
+              </a:solidFill>
+              <a:uFill>
+                <a:solidFill>
+                  <a:srgbClr val="ffffff"/>
+                </a:solidFill>
+              </a:uFill>
+              <a:latin typeface="Arial"/>
+            </a:endParaRPr>
+          </a:p>
+        </p:txBody>
+      </p:sp>
+      <p:sp>
+        <p:nvSpPr>
+          <p:cNvPr id="58" name="PlaceHolder 4"/>
           <p:cNvSpPr>
             <a:spLocks noGrp="1"/>
           </p:cNvSpPr>
@@ -1578,7 +1594,7 @@
         <p:txBody>
           <a:bodyPr lIns="0" rIns="0" tIns="0" bIns="0"/>
           <a:p>
-            <a:endParaRPr b="0" lang="en-IN" sz="1400" spc="-1" strike="noStrike">
+            <a:endParaRPr b="0" lang="en-IN" sz="3200" spc="-1" strike="noStrike">
               <a:solidFill>
                 <a:srgbClr val="000000"/>
               </a:solidFill>
@@ -1616,7 +1632,7 @@
       </p:grpSpPr>
       <p:sp>
         <p:nvSpPr>
-          <p:cNvPr id="65" name="PlaceHolder 1"/>
+          <p:cNvPr id="59" name="PlaceHolder 1"/>
           <p:cNvSpPr>
             <a:spLocks noGrp="1"/>
           </p:cNvSpPr>
@@ -1636,23 +1652,24 @@
         <p:txBody>
           <a:bodyPr lIns="0" rIns="0" tIns="0" bIns="0" anchor="ctr"/>
           <a:p>
-            <a:endParaRPr b="0" lang="en-IN" sz="1400" spc="-1" strike="noStrike">
-              <a:solidFill>
-                <a:srgbClr val="000000"/>
-              </a:solidFill>
-              <a:uFill>
-                <a:solidFill>
-                  <a:srgbClr val="ffffff"/>
-                </a:solidFill>
-              </a:uFill>
-              <a:latin typeface="Arial"/>
-            </a:endParaRPr>
-          </a:p>
-        </p:txBody>
-      </p:sp>
-      <p:sp>
-        <p:nvSpPr>
-          <p:cNvPr id="66" name="PlaceHolder 2"/>
+            <a:pPr algn="ctr"/>
+            <a:endParaRPr b="0" lang="en-IN" sz="4400" spc="-1" strike="noStrike">
+              <a:solidFill>
+                <a:srgbClr val="000000"/>
+              </a:solidFill>
+              <a:uFill>
+                <a:solidFill>
+                  <a:srgbClr val="ffffff"/>
+                </a:solidFill>
+              </a:uFill>
+              <a:latin typeface="Arial"/>
+            </a:endParaRPr>
+          </a:p>
+        </p:txBody>
+      </p:sp>
+      <p:sp>
+        <p:nvSpPr>
+          <p:cNvPr id="60" name="PlaceHolder 2"/>
           <p:cNvSpPr>
             <a:spLocks noGrp="1"/>
           </p:cNvSpPr>
@@ -1672,23 +1689,23 @@
         <p:txBody>
           <a:bodyPr lIns="0" rIns="0" tIns="0" bIns="0"/>
           <a:p>
-            <a:endParaRPr b="0" lang="en-IN" sz="1400" spc="-1" strike="noStrike">
-              <a:solidFill>
-                <a:srgbClr val="000000"/>
-              </a:solidFill>
-              <a:uFill>
-                <a:solidFill>
-                  <a:srgbClr val="ffffff"/>
-                </a:solidFill>
-              </a:uFill>
-              <a:latin typeface="Arial"/>
-            </a:endParaRPr>
-          </a:p>
-        </p:txBody>
-      </p:sp>
-      <p:sp>
-        <p:nvSpPr>
-          <p:cNvPr id="67" name="PlaceHolder 3"/>
+            <a:endParaRPr b="0" lang="en-IN" sz="3200" spc="-1" strike="noStrike">
+              <a:solidFill>
+                <a:srgbClr val="000000"/>
+              </a:solidFill>
+              <a:uFill>
+                <a:solidFill>
+                  <a:srgbClr val="ffffff"/>
+                </a:solidFill>
+              </a:uFill>
+              <a:latin typeface="Arial"/>
+            </a:endParaRPr>
+          </a:p>
+        </p:txBody>
+      </p:sp>
+      <p:sp>
+        <p:nvSpPr>
+          <p:cNvPr id="61" name="PlaceHolder 3"/>
           <p:cNvSpPr>
             <a:spLocks noGrp="1"/>
           </p:cNvSpPr>
@@ -1708,7 +1725,7 @@
         <p:txBody>
           <a:bodyPr lIns="0" rIns="0" tIns="0" bIns="0"/>
           <a:p>
-            <a:endParaRPr b="0" lang="en-IN" sz="1400" spc="-1" strike="noStrike">
+            <a:endParaRPr b="0" lang="en-IN" sz="3200" spc="-1" strike="noStrike">
               <a:solidFill>
                 <a:srgbClr val="000000"/>
               </a:solidFill>
@@ -1746,7 +1763,7 @@
       </p:grpSpPr>
       <p:sp>
         <p:nvSpPr>
-          <p:cNvPr id="68" name="PlaceHolder 1"/>
+          <p:cNvPr id="62" name="PlaceHolder 1"/>
           <p:cNvSpPr>
             <a:spLocks noGrp="1"/>
           </p:cNvSpPr>
@@ -1766,23 +1783,24 @@
         <p:txBody>
           <a:bodyPr lIns="0" rIns="0" tIns="0" bIns="0" anchor="ctr"/>
           <a:p>
-            <a:endParaRPr b="0" lang="en-IN" sz="1400" spc="-1" strike="noStrike">
-              <a:solidFill>
-                <a:srgbClr val="000000"/>
-              </a:solidFill>
-              <a:uFill>
-                <a:solidFill>
-                  <a:srgbClr val="ffffff"/>
-                </a:solidFill>
-              </a:uFill>
-              <a:latin typeface="Arial"/>
-            </a:endParaRPr>
-          </a:p>
-        </p:txBody>
-      </p:sp>
-      <p:sp>
-        <p:nvSpPr>
-          <p:cNvPr id="69" name="PlaceHolder 2"/>
+            <a:pPr algn="ctr"/>
+            <a:endParaRPr b="0" lang="en-IN" sz="4400" spc="-1" strike="noStrike">
+              <a:solidFill>
+                <a:srgbClr val="000000"/>
+              </a:solidFill>
+              <a:uFill>
+                <a:solidFill>
+                  <a:srgbClr val="ffffff"/>
+                </a:solidFill>
+              </a:uFill>
+              <a:latin typeface="Arial"/>
+            </a:endParaRPr>
+          </a:p>
+        </p:txBody>
+      </p:sp>
+      <p:sp>
+        <p:nvSpPr>
+          <p:cNvPr id="63" name="PlaceHolder 2"/>
           <p:cNvSpPr>
             <a:spLocks noGrp="1"/>
           </p:cNvSpPr>
@@ -1802,23 +1820,23 @@
         <p:txBody>
           <a:bodyPr lIns="0" rIns="0" tIns="0" bIns="0"/>
           <a:p>
-            <a:endParaRPr b="0" lang="en-IN" sz="1400" spc="-1" strike="noStrike">
-              <a:solidFill>
-                <a:srgbClr val="000000"/>
-              </a:solidFill>
-              <a:uFill>
-                <a:solidFill>
-                  <a:srgbClr val="ffffff"/>
-                </a:solidFill>
-              </a:uFill>
-              <a:latin typeface="Arial"/>
-            </a:endParaRPr>
-          </a:p>
-        </p:txBody>
-      </p:sp>
-      <p:sp>
-        <p:nvSpPr>
-          <p:cNvPr id="70" name="PlaceHolder 3"/>
+            <a:endParaRPr b="0" lang="en-IN" sz="3200" spc="-1" strike="noStrike">
+              <a:solidFill>
+                <a:srgbClr val="000000"/>
+              </a:solidFill>
+              <a:uFill>
+                <a:solidFill>
+                  <a:srgbClr val="ffffff"/>
+                </a:solidFill>
+              </a:uFill>
+              <a:latin typeface="Arial"/>
+            </a:endParaRPr>
+          </a:p>
+        </p:txBody>
+      </p:sp>
+      <p:sp>
+        <p:nvSpPr>
+          <p:cNvPr id="64" name="PlaceHolder 3"/>
           <p:cNvSpPr>
             <a:spLocks noGrp="1"/>
           </p:cNvSpPr>
@@ -1838,23 +1856,23 @@
         <p:txBody>
           <a:bodyPr lIns="0" rIns="0" tIns="0" bIns="0"/>
           <a:p>
-            <a:endParaRPr b="0" lang="en-IN" sz="1400" spc="-1" strike="noStrike">
-              <a:solidFill>
-                <a:srgbClr val="000000"/>
-              </a:solidFill>
-              <a:uFill>
-                <a:solidFill>
-                  <a:srgbClr val="ffffff"/>
-                </a:solidFill>
-              </a:uFill>
-              <a:latin typeface="Arial"/>
-            </a:endParaRPr>
-          </a:p>
-        </p:txBody>
-      </p:sp>
-      <p:sp>
-        <p:nvSpPr>
-          <p:cNvPr id="71" name="PlaceHolder 4"/>
+            <a:endParaRPr b="0" lang="en-IN" sz="3200" spc="-1" strike="noStrike">
+              <a:solidFill>
+                <a:srgbClr val="000000"/>
+              </a:solidFill>
+              <a:uFill>
+                <a:solidFill>
+                  <a:srgbClr val="ffffff"/>
+                </a:solidFill>
+              </a:uFill>
+              <a:latin typeface="Arial"/>
+            </a:endParaRPr>
+          </a:p>
+        </p:txBody>
+      </p:sp>
+      <p:sp>
+        <p:nvSpPr>
+          <p:cNvPr id="65" name="PlaceHolder 4"/>
           <p:cNvSpPr>
             <a:spLocks noGrp="1"/>
           </p:cNvSpPr>
@@ -1874,23 +1892,23 @@
         <p:txBody>
           <a:bodyPr lIns="0" rIns="0" tIns="0" bIns="0"/>
           <a:p>
-            <a:endParaRPr b="0" lang="en-IN" sz="1400" spc="-1" strike="noStrike">
-              <a:solidFill>
-                <a:srgbClr val="000000"/>
-              </a:solidFill>
-              <a:uFill>
-                <a:solidFill>
-                  <a:srgbClr val="ffffff"/>
-                </a:solidFill>
-              </a:uFill>
-              <a:latin typeface="Arial"/>
-            </a:endParaRPr>
-          </a:p>
-        </p:txBody>
-      </p:sp>
-      <p:sp>
-        <p:nvSpPr>
-          <p:cNvPr id="72" name="PlaceHolder 5"/>
+            <a:endParaRPr b="0" lang="en-IN" sz="3200" spc="-1" strike="noStrike">
+              <a:solidFill>
+                <a:srgbClr val="000000"/>
+              </a:solidFill>
+              <a:uFill>
+                <a:solidFill>
+                  <a:srgbClr val="ffffff"/>
+                </a:solidFill>
+              </a:uFill>
+              <a:latin typeface="Arial"/>
+            </a:endParaRPr>
+          </a:p>
+        </p:txBody>
+      </p:sp>
+      <p:sp>
+        <p:nvSpPr>
+          <p:cNvPr id="66" name="PlaceHolder 5"/>
           <p:cNvSpPr>
             <a:spLocks noGrp="1"/>
           </p:cNvSpPr>
@@ -1910,7 +1928,7 @@
         <p:txBody>
           <a:bodyPr lIns="0" rIns="0" tIns="0" bIns="0"/>
           <a:p>
-            <a:endParaRPr b="0" lang="en-IN" sz="1400" spc="-1" strike="noStrike">
+            <a:endParaRPr b="0" lang="en-IN" sz="3200" spc="-1" strike="noStrike">
               <a:solidFill>
                 <a:srgbClr val="000000"/>
               </a:solidFill>
@@ -1948,7 +1966,7 @@
       </p:grpSpPr>
       <p:sp>
         <p:nvSpPr>
-          <p:cNvPr id="73" name="PlaceHolder 1"/>
+          <p:cNvPr id="67" name="PlaceHolder 1"/>
           <p:cNvSpPr>
             <a:spLocks noGrp="1"/>
           </p:cNvSpPr>
@@ -1968,23 +1986,24 @@
         <p:txBody>
           <a:bodyPr lIns="0" rIns="0" tIns="0" bIns="0" anchor="ctr"/>
           <a:p>
-            <a:endParaRPr b="0" lang="en-IN" sz="1400" spc="-1" strike="noStrike">
-              <a:solidFill>
-                <a:srgbClr val="000000"/>
-              </a:solidFill>
-              <a:uFill>
-                <a:solidFill>
-                  <a:srgbClr val="ffffff"/>
-                </a:solidFill>
-              </a:uFill>
-              <a:latin typeface="Arial"/>
-            </a:endParaRPr>
-          </a:p>
-        </p:txBody>
-      </p:sp>
-      <p:sp>
-        <p:nvSpPr>
-          <p:cNvPr id="74" name="PlaceHolder 2"/>
+            <a:pPr algn="ctr"/>
+            <a:endParaRPr b="0" lang="en-IN" sz="4400" spc="-1" strike="noStrike">
+              <a:solidFill>
+                <a:srgbClr val="000000"/>
+              </a:solidFill>
+              <a:uFill>
+                <a:solidFill>
+                  <a:srgbClr val="ffffff"/>
+                </a:solidFill>
+              </a:uFill>
+              <a:latin typeface="Arial"/>
+            </a:endParaRPr>
+          </a:p>
+        </p:txBody>
+      </p:sp>
+      <p:sp>
+        <p:nvSpPr>
+          <p:cNvPr id="68" name="PlaceHolder 2"/>
           <p:cNvSpPr>
             <a:spLocks noGrp="1"/>
           </p:cNvSpPr>
@@ -2004,23 +2023,23 @@
         <p:txBody>
           <a:bodyPr lIns="0" rIns="0" tIns="0" bIns="0"/>
           <a:p>
-            <a:endParaRPr b="0" lang="en-IN" sz="1400" spc="-1" strike="noStrike">
-              <a:solidFill>
-                <a:srgbClr val="000000"/>
-              </a:solidFill>
-              <a:uFill>
-                <a:solidFill>
-                  <a:srgbClr val="ffffff"/>
-                </a:solidFill>
-              </a:uFill>
-              <a:latin typeface="Arial"/>
-            </a:endParaRPr>
-          </a:p>
-        </p:txBody>
-      </p:sp>
-      <p:sp>
-        <p:nvSpPr>
-          <p:cNvPr id="75" name="PlaceHolder 3"/>
+            <a:endParaRPr b="0" lang="en-IN" sz="3200" spc="-1" strike="noStrike">
+              <a:solidFill>
+                <a:srgbClr val="000000"/>
+              </a:solidFill>
+              <a:uFill>
+                <a:solidFill>
+                  <a:srgbClr val="ffffff"/>
+                </a:solidFill>
+              </a:uFill>
+              <a:latin typeface="Arial"/>
+            </a:endParaRPr>
+          </a:p>
+        </p:txBody>
+      </p:sp>
+      <p:sp>
+        <p:nvSpPr>
+          <p:cNvPr id="69" name="PlaceHolder 3"/>
           <p:cNvSpPr>
             <a:spLocks noGrp="1"/>
           </p:cNvSpPr>
@@ -2040,7 +2059,7 @@
         <p:txBody>
           <a:bodyPr lIns="0" rIns="0" tIns="0" bIns="0"/>
           <a:p>
-            <a:endParaRPr b="0" lang="en-IN" sz="1400" spc="-1" strike="noStrike">
+            <a:endParaRPr b="0" lang="en-IN" sz="3200" spc="-1" strike="noStrike">
               <a:solidFill>
                 <a:srgbClr val="000000"/>
               </a:solidFill>
@@ -2056,7 +2075,7 @@
       </p:sp>
       <p:pic>
         <p:nvPicPr>
-          <p:cNvPr id="76" name="" descr=""/>
+          <p:cNvPr id="70" name="" descr=""/>
           <p:cNvPicPr/>
           <p:nvPr/>
         </p:nvPicPr>
@@ -2079,7 +2098,7 @@
       </p:pic>
       <p:pic>
         <p:nvPicPr>
-          <p:cNvPr id="77" name="" descr=""/>
+          <p:cNvPr id="71" name="" descr=""/>
           <p:cNvPicPr/>
           <p:nvPr/>
         </p:nvPicPr>
@@ -2124,7 +2143,7 @@
       </p:grpSpPr>
       <p:sp>
         <p:nvSpPr>
-          <p:cNvPr id="7" name="PlaceHolder 1"/>
+          <p:cNvPr id="4" name="PlaceHolder 1"/>
           <p:cNvSpPr>
             <a:spLocks noGrp="1"/>
           </p:cNvSpPr>
@@ -2144,23 +2163,24 @@
         <p:txBody>
           <a:bodyPr lIns="0" rIns="0" tIns="0" bIns="0" anchor="ctr"/>
           <a:p>
-            <a:endParaRPr b="0" lang="en-IN" sz="1400" spc="-1" strike="noStrike">
-              <a:solidFill>
-                <a:srgbClr val="000000"/>
-              </a:solidFill>
-              <a:uFill>
-                <a:solidFill>
-                  <a:srgbClr val="ffffff"/>
-                </a:solidFill>
-              </a:uFill>
-              <a:latin typeface="Arial"/>
-            </a:endParaRPr>
-          </a:p>
-        </p:txBody>
-      </p:sp>
-      <p:sp>
-        <p:nvSpPr>
-          <p:cNvPr id="8" name="PlaceHolder 2"/>
+            <a:pPr algn="ctr"/>
+            <a:endParaRPr b="0" lang="en-IN" sz="4400" spc="-1" strike="noStrike">
+              <a:solidFill>
+                <a:srgbClr val="000000"/>
+              </a:solidFill>
+              <a:uFill>
+                <a:solidFill>
+                  <a:srgbClr val="ffffff"/>
+                </a:solidFill>
+              </a:uFill>
+              <a:latin typeface="Arial"/>
+            </a:endParaRPr>
+          </a:p>
+        </p:txBody>
+      </p:sp>
+      <p:sp>
+        <p:nvSpPr>
+          <p:cNvPr id="5" name="PlaceHolder 2"/>
           <p:cNvSpPr>
             <a:spLocks noGrp="1"/>
           </p:cNvSpPr>
@@ -2180,7 +2200,7 @@
         <p:txBody>
           <a:bodyPr lIns="0" rIns="0" tIns="0" bIns="0"/>
           <a:p>
-            <a:endParaRPr b="0" lang="en-IN" sz="1400" spc="-1" strike="noStrike">
+            <a:endParaRPr b="0" lang="en-IN" sz="3200" spc="-1" strike="noStrike">
               <a:solidFill>
                 <a:srgbClr val="000000"/>
               </a:solidFill>
@@ -2218,7 +2238,7 @@
       </p:grpSpPr>
       <p:sp>
         <p:nvSpPr>
-          <p:cNvPr id="9" name="PlaceHolder 1"/>
+          <p:cNvPr id="6" name="PlaceHolder 1"/>
           <p:cNvSpPr>
             <a:spLocks noGrp="1"/>
           </p:cNvSpPr>
@@ -2238,23 +2258,24 @@
         <p:txBody>
           <a:bodyPr lIns="0" rIns="0" tIns="0" bIns="0" anchor="ctr"/>
           <a:p>
-            <a:endParaRPr b="0" lang="en-IN" sz="1400" spc="-1" strike="noStrike">
-              <a:solidFill>
-                <a:srgbClr val="000000"/>
-              </a:solidFill>
-              <a:uFill>
-                <a:solidFill>
-                  <a:srgbClr val="ffffff"/>
-                </a:solidFill>
-              </a:uFill>
-              <a:latin typeface="Arial"/>
-            </a:endParaRPr>
-          </a:p>
-        </p:txBody>
-      </p:sp>
-      <p:sp>
-        <p:nvSpPr>
-          <p:cNvPr id="10" name="PlaceHolder 2"/>
+            <a:pPr algn="ctr"/>
+            <a:endParaRPr b="0" lang="en-IN" sz="4400" spc="-1" strike="noStrike">
+              <a:solidFill>
+                <a:srgbClr val="000000"/>
+              </a:solidFill>
+              <a:uFill>
+                <a:solidFill>
+                  <a:srgbClr val="ffffff"/>
+                </a:solidFill>
+              </a:uFill>
+              <a:latin typeface="Arial"/>
+            </a:endParaRPr>
+          </a:p>
+        </p:txBody>
+      </p:sp>
+      <p:sp>
+        <p:nvSpPr>
+          <p:cNvPr id="7" name="PlaceHolder 2"/>
           <p:cNvSpPr>
             <a:spLocks noGrp="1"/>
           </p:cNvSpPr>
@@ -2274,23 +2295,23 @@
         <p:txBody>
           <a:bodyPr lIns="0" rIns="0" tIns="0" bIns="0"/>
           <a:p>
-            <a:endParaRPr b="0" lang="en-IN" sz="1400" spc="-1" strike="noStrike">
-              <a:solidFill>
-                <a:srgbClr val="000000"/>
-              </a:solidFill>
-              <a:uFill>
-                <a:solidFill>
-                  <a:srgbClr val="ffffff"/>
-                </a:solidFill>
-              </a:uFill>
-              <a:latin typeface="Arial"/>
-            </a:endParaRPr>
-          </a:p>
-        </p:txBody>
-      </p:sp>
-      <p:sp>
-        <p:nvSpPr>
-          <p:cNvPr id="11" name="PlaceHolder 3"/>
+            <a:endParaRPr b="0" lang="en-IN" sz="3200" spc="-1" strike="noStrike">
+              <a:solidFill>
+                <a:srgbClr val="000000"/>
+              </a:solidFill>
+              <a:uFill>
+                <a:solidFill>
+                  <a:srgbClr val="ffffff"/>
+                </a:solidFill>
+              </a:uFill>
+              <a:latin typeface="Arial"/>
+            </a:endParaRPr>
+          </a:p>
+        </p:txBody>
+      </p:sp>
+      <p:sp>
+        <p:nvSpPr>
+          <p:cNvPr id="8" name="PlaceHolder 3"/>
           <p:cNvSpPr>
             <a:spLocks noGrp="1"/>
           </p:cNvSpPr>
@@ -2310,7 +2331,7 @@
         <p:txBody>
           <a:bodyPr lIns="0" rIns="0" tIns="0" bIns="0"/>
           <a:p>
-            <a:endParaRPr b="0" lang="en-IN" sz="1400" spc="-1" strike="noStrike">
+            <a:endParaRPr b="0" lang="en-IN" sz="3200" spc="-1" strike="noStrike">
               <a:solidFill>
                 <a:srgbClr val="000000"/>
               </a:solidFill>
@@ -2348,7 +2369,7 @@
       </p:grpSpPr>
       <p:sp>
         <p:nvSpPr>
-          <p:cNvPr id="12" name="PlaceHolder 1"/>
+          <p:cNvPr id="9" name="PlaceHolder 1"/>
           <p:cNvSpPr>
             <a:spLocks noGrp="1"/>
           </p:cNvSpPr>
@@ -2368,7 +2389,8 @@
         <p:txBody>
           <a:bodyPr lIns="0" rIns="0" tIns="0" bIns="0" anchor="ctr"/>
           <a:p>
-            <a:endParaRPr b="0" lang="en-IN" sz="1400" spc="-1" strike="noStrike">
+            <a:pPr algn="ctr"/>
+            <a:endParaRPr b="0" lang="en-IN" sz="4400" spc="-1" strike="noStrike">
               <a:solidFill>
                 <a:srgbClr val="000000"/>
               </a:solidFill>
@@ -2406,7 +2428,7 @@
       </p:grpSpPr>
       <p:sp>
         <p:nvSpPr>
-          <p:cNvPr id="13" name="PlaceHolder 1"/>
+          <p:cNvPr id="10" name="PlaceHolder 1"/>
           <p:cNvSpPr>
             <a:spLocks noGrp="1"/>
           </p:cNvSpPr>
@@ -2465,7 +2487,7 @@
       </p:grpSpPr>
       <p:sp>
         <p:nvSpPr>
-          <p:cNvPr id="14" name="PlaceHolder 1"/>
+          <p:cNvPr id="11" name="PlaceHolder 1"/>
           <p:cNvSpPr>
             <a:spLocks noGrp="1"/>
           </p:cNvSpPr>
@@ -2485,23 +2507,24 @@
         <p:txBody>
           <a:bodyPr lIns="0" rIns="0" tIns="0" bIns="0" anchor="ctr"/>
           <a:p>
-            <a:endParaRPr b="0" lang="en-IN" sz="1400" spc="-1" strike="noStrike">
-              <a:solidFill>
-                <a:srgbClr val="000000"/>
-              </a:solidFill>
-              <a:uFill>
-                <a:solidFill>
-                  <a:srgbClr val="ffffff"/>
-                </a:solidFill>
-              </a:uFill>
-              <a:latin typeface="Arial"/>
-            </a:endParaRPr>
-          </a:p>
-        </p:txBody>
-      </p:sp>
-      <p:sp>
-        <p:nvSpPr>
-          <p:cNvPr id="15" name="PlaceHolder 2"/>
+            <a:pPr algn="ctr"/>
+            <a:endParaRPr b="0" lang="en-IN" sz="4400" spc="-1" strike="noStrike">
+              <a:solidFill>
+                <a:srgbClr val="000000"/>
+              </a:solidFill>
+              <a:uFill>
+                <a:solidFill>
+                  <a:srgbClr val="ffffff"/>
+                </a:solidFill>
+              </a:uFill>
+              <a:latin typeface="Arial"/>
+            </a:endParaRPr>
+          </a:p>
+        </p:txBody>
+      </p:sp>
+      <p:sp>
+        <p:nvSpPr>
+          <p:cNvPr id="12" name="PlaceHolder 2"/>
           <p:cNvSpPr>
             <a:spLocks noGrp="1"/>
           </p:cNvSpPr>
@@ -2521,23 +2544,23 @@
         <p:txBody>
           <a:bodyPr lIns="0" rIns="0" tIns="0" bIns="0"/>
           <a:p>
-            <a:endParaRPr b="0" lang="en-IN" sz="1400" spc="-1" strike="noStrike">
-              <a:solidFill>
-                <a:srgbClr val="000000"/>
-              </a:solidFill>
-              <a:uFill>
-                <a:solidFill>
-                  <a:srgbClr val="ffffff"/>
-                </a:solidFill>
-              </a:uFill>
-              <a:latin typeface="Arial"/>
-            </a:endParaRPr>
-          </a:p>
-        </p:txBody>
-      </p:sp>
-      <p:sp>
-        <p:nvSpPr>
-          <p:cNvPr id="16" name="PlaceHolder 3"/>
+            <a:endParaRPr b="0" lang="en-IN" sz="3200" spc="-1" strike="noStrike">
+              <a:solidFill>
+                <a:srgbClr val="000000"/>
+              </a:solidFill>
+              <a:uFill>
+                <a:solidFill>
+                  <a:srgbClr val="ffffff"/>
+                </a:solidFill>
+              </a:uFill>
+              <a:latin typeface="Arial"/>
+            </a:endParaRPr>
+          </a:p>
+        </p:txBody>
+      </p:sp>
+      <p:sp>
+        <p:nvSpPr>
+          <p:cNvPr id="13" name="PlaceHolder 3"/>
           <p:cNvSpPr>
             <a:spLocks noGrp="1"/>
           </p:cNvSpPr>
@@ -2557,23 +2580,23 @@
         <p:txBody>
           <a:bodyPr lIns="0" rIns="0" tIns="0" bIns="0"/>
           <a:p>
-            <a:endParaRPr b="0" lang="en-IN" sz="1400" spc="-1" strike="noStrike">
-              <a:solidFill>
-                <a:srgbClr val="000000"/>
-              </a:solidFill>
-              <a:uFill>
-                <a:solidFill>
-                  <a:srgbClr val="ffffff"/>
-                </a:solidFill>
-              </a:uFill>
-              <a:latin typeface="Arial"/>
-            </a:endParaRPr>
-          </a:p>
-        </p:txBody>
-      </p:sp>
-      <p:sp>
-        <p:nvSpPr>
-          <p:cNvPr id="17" name="PlaceHolder 4"/>
+            <a:endParaRPr b="0" lang="en-IN" sz="3200" spc="-1" strike="noStrike">
+              <a:solidFill>
+                <a:srgbClr val="000000"/>
+              </a:solidFill>
+              <a:uFill>
+                <a:solidFill>
+                  <a:srgbClr val="ffffff"/>
+                </a:solidFill>
+              </a:uFill>
+              <a:latin typeface="Arial"/>
+            </a:endParaRPr>
+          </a:p>
+        </p:txBody>
+      </p:sp>
+      <p:sp>
+        <p:nvSpPr>
+          <p:cNvPr id="14" name="PlaceHolder 4"/>
           <p:cNvSpPr>
             <a:spLocks noGrp="1"/>
           </p:cNvSpPr>
@@ -2593,7 +2616,7 @@
         <p:txBody>
           <a:bodyPr lIns="0" rIns="0" tIns="0" bIns="0"/>
           <a:p>
-            <a:endParaRPr b="0" lang="en-IN" sz="1400" spc="-1" strike="noStrike">
+            <a:endParaRPr b="0" lang="en-IN" sz="3200" spc="-1" strike="noStrike">
               <a:solidFill>
                 <a:srgbClr val="000000"/>
               </a:solidFill>
@@ -2631,7 +2654,7 @@
       </p:grpSpPr>
       <p:sp>
         <p:nvSpPr>
-          <p:cNvPr id="18" name="PlaceHolder 1"/>
+          <p:cNvPr id="15" name="PlaceHolder 1"/>
           <p:cNvSpPr>
             <a:spLocks noGrp="1"/>
           </p:cNvSpPr>
@@ -2651,23 +2674,24 @@
         <p:txBody>
           <a:bodyPr lIns="0" rIns="0" tIns="0" bIns="0" anchor="ctr"/>
           <a:p>
-            <a:endParaRPr b="0" lang="en-IN" sz="1400" spc="-1" strike="noStrike">
-              <a:solidFill>
-                <a:srgbClr val="000000"/>
-              </a:solidFill>
-              <a:uFill>
-                <a:solidFill>
-                  <a:srgbClr val="ffffff"/>
-                </a:solidFill>
-              </a:uFill>
-              <a:latin typeface="Arial"/>
-            </a:endParaRPr>
-          </a:p>
-        </p:txBody>
-      </p:sp>
-      <p:sp>
-        <p:nvSpPr>
-          <p:cNvPr id="19" name="PlaceHolder 2"/>
+            <a:pPr algn="ctr"/>
+            <a:endParaRPr b="0" lang="en-IN" sz="4400" spc="-1" strike="noStrike">
+              <a:solidFill>
+                <a:srgbClr val="000000"/>
+              </a:solidFill>
+              <a:uFill>
+                <a:solidFill>
+                  <a:srgbClr val="ffffff"/>
+                </a:solidFill>
+              </a:uFill>
+              <a:latin typeface="Arial"/>
+            </a:endParaRPr>
+          </a:p>
+        </p:txBody>
+      </p:sp>
+      <p:sp>
+        <p:nvSpPr>
+          <p:cNvPr id="16" name="PlaceHolder 2"/>
           <p:cNvSpPr>
             <a:spLocks noGrp="1"/>
           </p:cNvSpPr>
@@ -2687,23 +2711,23 @@
         <p:txBody>
           <a:bodyPr lIns="0" rIns="0" tIns="0" bIns="0"/>
           <a:p>
-            <a:endParaRPr b="0" lang="en-IN" sz="1400" spc="-1" strike="noStrike">
-              <a:solidFill>
-                <a:srgbClr val="000000"/>
-              </a:solidFill>
-              <a:uFill>
-                <a:solidFill>
-                  <a:srgbClr val="ffffff"/>
-                </a:solidFill>
-              </a:uFill>
-              <a:latin typeface="Arial"/>
-            </a:endParaRPr>
-          </a:p>
-        </p:txBody>
-      </p:sp>
-      <p:sp>
-        <p:nvSpPr>
-          <p:cNvPr id="20" name="PlaceHolder 3"/>
+            <a:endParaRPr b="0" lang="en-IN" sz="3200" spc="-1" strike="noStrike">
+              <a:solidFill>
+                <a:srgbClr val="000000"/>
+              </a:solidFill>
+              <a:uFill>
+                <a:solidFill>
+                  <a:srgbClr val="ffffff"/>
+                </a:solidFill>
+              </a:uFill>
+              <a:latin typeface="Arial"/>
+            </a:endParaRPr>
+          </a:p>
+        </p:txBody>
+      </p:sp>
+      <p:sp>
+        <p:nvSpPr>
+          <p:cNvPr id="17" name="PlaceHolder 3"/>
           <p:cNvSpPr>
             <a:spLocks noGrp="1"/>
           </p:cNvSpPr>
@@ -2723,23 +2747,23 @@
         <p:txBody>
           <a:bodyPr lIns="0" rIns="0" tIns="0" bIns="0"/>
           <a:p>
-            <a:endParaRPr b="0" lang="en-IN" sz="1400" spc="-1" strike="noStrike">
-              <a:solidFill>
-                <a:srgbClr val="000000"/>
-              </a:solidFill>
-              <a:uFill>
-                <a:solidFill>
-                  <a:srgbClr val="ffffff"/>
-                </a:solidFill>
-              </a:uFill>
-              <a:latin typeface="Arial"/>
-            </a:endParaRPr>
-          </a:p>
-        </p:txBody>
-      </p:sp>
-      <p:sp>
-        <p:nvSpPr>
-          <p:cNvPr id="21" name="PlaceHolder 4"/>
+            <a:endParaRPr b="0" lang="en-IN" sz="3200" spc="-1" strike="noStrike">
+              <a:solidFill>
+                <a:srgbClr val="000000"/>
+              </a:solidFill>
+              <a:uFill>
+                <a:solidFill>
+                  <a:srgbClr val="ffffff"/>
+                </a:solidFill>
+              </a:uFill>
+              <a:latin typeface="Arial"/>
+            </a:endParaRPr>
+          </a:p>
+        </p:txBody>
+      </p:sp>
+      <p:sp>
+        <p:nvSpPr>
+          <p:cNvPr id="18" name="PlaceHolder 4"/>
           <p:cNvSpPr>
             <a:spLocks noGrp="1"/>
           </p:cNvSpPr>
@@ -2759,7 +2783,7 @@
         <p:txBody>
           <a:bodyPr lIns="0" rIns="0" tIns="0" bIns="0"/>
           <a:p>
-            <a:endParaRPr b="0" lang="en-IN" sz="1400" spc="-1" strike="noStrike">
+            <a:endParaRPr b="0" lang="en-IN" sz="3200" spc="-1" strike="noStrike">
               <a:solidFill>
                 <a:srgbClr val="000000"/>
               </a:solidFill>
@@ -2797,7 +2821,7 @@
       </p:grpSpPr>
       <p:sp>
         <p:nvSpPr>
-          <p:cNvPr id="22" name="PlaceHolder 1"/>
+          <p:cNvPr id="19" name="PlaceHolder 1"/>
           <p:cNvSpPr>
             <a:spLocks noGrp="1"/>
           </p:cNvSpPr>
@@ -2817,23 +2841,24 @@
         <p:txBody>
           <a:bodyPr lIns="0" rIns="0" tIns="0" bIns="0" anchor="ctr"/>
           <a:p>
-            <a:endParaRPr b="0" lang="en-IN" sz="1400" spc="-1" strike="noStrike">
-              <a:solidFill>
-                <a:srgbClr val="000000"/>
-              </a:solidFill>
-              <a:uFill>
-                <a:solidFill>
-                  <a:srgbClr val="ffffff"/>
-                </a:solidFill>
-              </a:uFill>
-              <a:latin typeface="Arial"/>
-            </a:endParaRPr>
-          </a:p>
-        </p:txBody>
-      </p:sp>
-      <p:sp>
-        <p:nvSpPr>
-          <p:cNvPr id="23" name="PlaceHolder 2"/>
+            <a:pPr algn="ctr"/>
+            <a:endParaRPr b="0" lang="en-IN" sz="4400" spc="-1" strike="noStrike">
+              <a:solidFill>
+                <a:srgbClr val="000000"/>
+              </a:solidFill>
+              <a:uFill>
+                <a:solidFill>
+                  <a:srgbClr val="ffffff"/>
+                </a:solidFill>
+              </a:uFill>
+              <a:latin typeface="Arial"/>
+            </a:endParaRPr>
+          </a:p>
+        </p:txBody>
+      </p:sp>
+      <p:sp>
+        <p:nvSpPr>
+          <p:cNvPr id="20" name="PlaceHolder 2"/>
           <p:cNvSpPr>
             <a:spLocks noGrp="1"/>
           </p:cNvSpPr>
@@ -2853,23 +2878,23 @@
         <p:txBody>
           <a:bodyPr lIns="0" rIns="0" tIns="0" bIns="0"/>
           <a:p>
-            <a:endParaRPr b="0" lang="en-IN" sz="1400" spc="-1" strike="noStrike">
-              <a:solidFill>
-                <a:srgbClr val="000000"/>
-              </a:solidFill>
-              <a:uFill>
-                <a:solidFill>
-                  <a:srgbClr val="ffffff"/>
-                </a:solidFill>
-              </a:uFill>
-              <a:latin typeface="Arial"/>
-            </a:endParaRPr>
-          </a:p>
-        </p:txBody>
-      </p:sp>
-      <p:sp>
-        <p:nvSpPr>
-          <p:cNvPr id="24" name="PlaceHolder 3"/>
+            <a:endParaRPr b="0" lang="en-IN" sz="3200" spc="-1" strike="noStrike">
+              <a:solidFill>
+                <a:srgbClr val="000000"/>
+              </a:solidFill>
+              <a:uFill>
+                <a:solidFill>
+                  <a:srgbClr val="ffffff"/>
+                </a:solidFill>
+              </a:uFill>
+              <a:latin typeface="Arial"/>
+            </a:endParaRPr>
+          </a:p>
+        </p:txBody>
+      </p:sp>
+      <p:sp>
+        <p:nvSpPr>
+          <p:cNvPr id="21" name="PlaceHolder 3"/>
           <p:cNvSpPr>
             <a:spLocks noGrp="1"/>
           </p:cNvSpPr>
@@ -2889,23 +2914,23 @@
         <p:txBody>
           <a:bodyPr lIns="0" rIns="0" tIns="0" bIns="0"/>
           <a:p>
-            <a:endParaRPr b="0" lang="en-IN" sz="1400" spc="-1" strike="noStrike">
-              <a:solidFill>
-                <a:srgbClr val="000000"/>
-              </a:solidFill>
-              <a:uFill>
-                <a:solidFill>
-                  <a:srgbClr val="ffffff"/>
-                </a:solidFill>
-              </a:uFill>
-              <a:latin typeface="Arial"/>
-            </a:endParaRPr>
-          </a:p>
-        </p:txBody>
-      </p:sp>
-      <p:sp>
-        <p:nvSpPr>
-          <p:cNvPr id="25" name="PlaceHolder 4"/>
+            <a:endParaRPr b="0" lang="en-IN" sz="3200" spc="-1" strike="noStrike">
+              <a:solidFill>
+                <a:srgbClr val="000000"/>
+              </a:solidFill>
+              <a:uFill>
+                <a:solidFill>
+                  <a:srgbClr val="ffffff"/>
+                </a:solidFill>
+              </a:uFill>
+              <a:latin typeface="Arial"/>
+            </a:endParaRPr>
+          </a:p>
+        </p:txBody>
+      </p:sp>
+      <p:sp>
+        <p:nvSpPr>
+          <p:cNvPr id="22" name="PlaceHolder 4"/>
           <p:cNvSpPr>
             <a:spLocks noGrp="1"/>
           </p:cNvSpPr>
@@ -2925,7 +2950,7 @@
         <p:txBody>
           <a:bodyPr lIns="0" rIns="0" tIns="0" bIns="0"/>
           <a:p>
-            <a:endParaRPr b="0" lang="en-IN" sz="1400" spc="-1" strike="noStrike">
+            <a:endParaRPr b="0" lang="en-IN" sz="3200" spc="-1" strike="noStrike">
               <a:solidFill>
                 <a:srgbClr val="000000"/>
               </a:solidFill>
@@ -2980,17 +3005,32 @@
         </p:nvSpPr>
         <p:spPr>
           <a:xfrm>
-            <a:off x="457200" y="274680"/>
-            <a:ext cx="8229240" cy="1142640"/>
-          </a:xfrm>
-          <a:prstGeom prst="rect">
-            <a:avLst/>
-          </a:prstGeom>
-        </p:spPr>
-        <p:txBody>
-          <a:bodyPr anchor="ctr"/>
-          <a:p>
-            <a:endParaRPr b="0" lang="en-IN" sz="1400" spc="-1" strike="noStrike">
+            <a:off x="457200" y="273600"/>
+            <a:ext cx="8229240" cy="1144800"/>
+          </a:xfrm>
+          <a:prstGeom prst="rect">
+            <a:avLst/>
+          </a:prstGeom>
+        </p:spPr>
+        <p:txBody>
+          <a:bodyPr lIns="0" rIns="0" tIns="0" bIns="0" anchor="ctr"/>
+          <a:p>
+            <a:pPr algn="ctr"/>
+            <a:r>
+              <a:rPr b="0" lang="en-IN" sz="4400" spc="-1" strike="noStrike">
+                <a:solidFill>
+                  <a:srgbClr val="000000"/>
+                </a:solidFill>
+                <a:uFill>
+                  <a:solidFill>
+                    <a:srgbClr val="ffffff"/>
+                  </a:solidFill>
+                </a:uFill>
+                <a:latin typeface="Arial"/>
+              </a:rPr>
+              <a:t>Click to edit the title text format</a:t>
+            </a:r>
+            <a:endParaRPr b="0" lang="en-IN" sz="4400" spc="-1" strike="noStrike">
               <a:solidFill>
                 <a:srgbClr val="000000"/>
               </a:solidFill>
@@ -3016,15 +3056,15 @@
         </p:nvSpPr>
         <p:spPr>
           <a:xfrm>
-            <a:off x="457200" y="1600200"/>
-            <a:ext cx="8229240" cy="4525560"/>
-          </a:xfrm>
-          <a:prstGeom prst="rect">
-            <a:avLst/>
-          </a:prstGeom>
-        </p:spPr>
-        <p:txBody>
-          <a:bodyPr/>
+            <a:off x="457200" y="1604520"/>
+            <a:ext cx="8229240" cy="3977280"/>
+          </a:xfrm>
+          <a:prstGeom prst="rect">
+            <a:avLst/>
+          </a:prstGeom>
+        </p:spPr>
+        <p:txBody>
+          <a:bodyPr lIns="0" rIns="0" tIns="0" bIns="0"/>
           <a:p>
             <a:pPr marL="432000" indent="-324000">
               <a:buClr>
@@ -3070,7 +3110,7 @@
               <a:buChar char=""/>
             </a:pPr>
             <a:r>
-              <a:rPr b="0" lang="en-IN" sz="3200" spc="-1" strike="noStrike">
+              <a:rPr b="0" lang="en-IN" sz="2800" spc="-1" strike="noStrike">
                 <a:solidFill>
                   <a:srgbClr val="000000"/>
                 </a:solidFill>
@@ -3083,7 +3123,7 @@
               </a:rPr>
               <a:t>Second Outline Level</a:t>
             </a:r>
-            <a:endParaRPr b="0" lang="en-IN" sz="3200" spc="-1" strike="noStrike">
+            <a:endParaRPr b="0" lang="en-IN" sz="2800" spc="-1" strike="noStrike">
               <a:solidFill>
                 <a:srgbClr val="000000"/>
               </a:solidFill>
@@ -3105,7 +3145,7 @@
               <a:buChar char=""/>
             </a:pPr>
             <a:r>
-              <a:rPr b="0" lang="en-IN" sz="3200" spc="-1" strike="noStrike">
+              <a:rPr b="0" lang="en-IN" sz="2400" spc="-1" strike="noStrike">
                 <a:solidFill>
                   <a:srgbClr val="000000"/>
                 </a:solidFill>
@@ -3118,7 +3158,7 @@
               </a:rPr>
               <a:t>Third Outline Level</a:t>
             </a:r>
-            <a:endParaRPr b="0" lang="en-IN" sz="3200" spc="-1" strike="noStrike">
+            <a:endParaRPr b="0" lang="en-IN" sz="2400" spc="-1" strike="noStrike">
               <a:solidFill>
                 <a:srgbClr val="000000"/>
               </a:solidFill>
@@ -3140,7 +3180,7 @@
               <a:buChar char=""/>
             </a:pPr>
             <a:r>
-              <a:rPr b="0" lang="en-IN" sz="3200" spc="-1" strike="noStrike">
+              <a:rPr b="0" lang="en-IN" sz="2000" spc="-1" strike="noStrike">
                 <a:solidFill>
                   <a:srgbClr val="000000"/>
                 </a:solidFill>
@@ -3153,7 +3193,7 @@
               </a:rPr>
               <a:t>Fourth Outline Level</a:t>
             </a:r>
-            <a:endParaRPr b="0" lang="en-IN" sz="3200" spc="-1" strike="noStrike">
+            <a:endParaRPr b="0" lang="en-IN" sz="2000" spc="-1" strike="noStrike">
               <a:solidFill>
                 <a:srgbClr val="000000"/>
               </a:solidFill>
@@ -3175,7 +3215,7 @@
               <a:buChar char=""/>
             </a:pPr>
             <a:r>
-              <a:rPr b="0" lang="en-IN" sz="3200" spc="-1" strike="noStrike">
+              <a:rPr b="0" lang="en-IN" sz="2000" spc="-1" strike="noStrike">
                 <a:solidFill>
                   <a:srgbClr val="000000"/>
                 </a:solidFill>
@@ -3188,7 +3228,7 @@
               </a:rPr>
               <a:t>Fifth Outline Level</a:t>
             </a:r>
-            <a:endParaRPr b="0" lang="en-IN" sz="3200" spc="-1" strike="noStrike">
+            <a:endParaRPr b="0" lang="en-IN" sz="2000" spc="-1" strike="noStrike">
               <a:solidFill>
                 <a:srgbClr val="000000"/>
               </a:solidFill>
@@ -3210,7 +3250,7 @@
               <a:buChar char=""/>
             </a:pPr>
             <a:r>
-              <a:rPr b="0" lang="en-IN" sz="3200" spc="-1" strike="noStrike">
+              <a:rPr b="0" lang="en-IN" sz="2000" spc="-1" strike="noStrike">
                 <a:solidFill>
                   <a:srgbClr val="000000"/>
                 </a:solidFill>
@@ -3223,7 +3263,7 @@
               </a:rPr>
               <a:t>Sixth Outline Level</a:t>
             </a:r>
-            <a:endParaRPr b="0" lang="en-IN" sz="3200" spc="-1" strike="noStrike">
+            <a:endParaRPr b="0" lang="en-IN" sz="2000" spc="-1" strike="noStrike">
               <a:solidFill>
                 <a:srgbClr val="000000"/>
               </a:solidFill>
@@ -3245,7 +3285,7 @@
               <a:buChar char=""/>
             </a:pPr>
             <a:r>
-              <a:rPr b="0" lang="en-IN" sz="3200" spc="-1" strike="noStrike">
+              <a:rPr b="0" lang="en-IN" sz="2000" spc="-1" strike="noStrike">
                 <a:solidFill>
                   <a:srgbClr val="000000"/>
                 </a:solidFill>
@@ -3258,144 +3298,16 @@
               </a:rPr>
               <a:t>Seventh Outline Level</a:t>
             </a:r>
-            <a:endParaRPr b="0" lang="en-IN" sz="3200" spc="-1" strike="noStrike">
-              <a:solidFill>
-                <a:srgbClr val="000000"/>
-              </a:solidFill>
-              <a:uFill>
-                <a:solidFill>
-                  <a:srgbClr val="ffffff"/>
-                </a:solidFill>
-              </a:uFill>
-              <a:latin typeface="Arial"/>
-            </a:endParaRPr>
-          </a:p>
-        </p:txBody>
-      </p:sp>
-      <p:sp>
-        <p:nvSpPr>
-          <p:cNvPr id="2" name="PlaceHolder 3"/>
-          <p:cNvSpPr>
-            <a:spLocks noGrp="1"/>
-          </p:cNvSpPr>
-          <p:nvPr>
-            <p:ph type="dt"/>
-          </p:nvPr>
-        </p:nvSpPr>
-        <p:spPr>
-          <a:xfrm>
-            <a:off x="457200" y="6356520"/>
-            <a:ext cx="2133360" cy="364680"/>
-          </a:xfrm>
-          <a:prstGeom prst="rect">
-            <a:avLst/>
-          </a:prstGeom>
-        </p:spPr>
-        <p:txBody>
-          <a:bodyPr anchor="ctr"/>
-          <a:p>
-            <a:endParaRPr b="0" lang="en-IN" sz="2400" spc="-1" strike="noStrike">
-              <a:solidFill>
-                <a:srgbClr val="000000"/>
-              </a:solidFill>
-              <a:uFill>
-                <a:solidFill>
-                  <a:srgbClr val="ffffff"/>
-                </a:solidFill>
-              </a:uFill>
-              <a:latin typeface="Times New Roman"/>
-            </a:endParaRPr>
-          </a:p>
-        </p:txBody>
-      </p:sp>
-      <p:sp>
-        <p:nvSpPr>
-          <p:cNvPr id="3" name="PlaceHolder 4"/>
-          <p:cNvSpPr>
-            <a:spLocks noGrp="1"/>
-          </p:cNvSpPr>
-          <p:nvPr>
-            <p:ph type="ftr"/>
-          </p:nvPr>
-        </p:nvSpPr>
-        <p:spPr>
-          <a:xfrm>
-            <a:off x="3124080" y="6356520"/>
-            <a:ext cx="2895120" cy="364680"/>
-          </a:xfrm>
-          <a:prstGeom prst="rect">
-            <a:avLst/>
-          </a:prstGeom>
-        </p:spPr>
-        <p:txBody>
-          <a:bodyPr anchor="ctr"/>
-          <a:p>
-            <a:endParaRPr b="0" lang="en-IN" sz="2400" spc="-1" strike="noStrike">
-              <a:solidFill>
-                <a:srgbClr val="000000"/>
-              </a:solidFill>
-              <a:uFill>
-                <a:solidFill>
-                  <a:srgbClr val="ffffff"/>
-                </a:solidFill>
-              </a:uFill>
-              <a:latin typeface="Times New Roman"/>
-            </a:endParaRPr>
-          </a:p>
-        </p:txBody>
-      </p:sp>
-      <p:sp>
-        <p:nvSpPr>
-          <p:cNvPr id="4" name="PlaceHolder 5"/>
-          <p:cNvSpPr>
-            <a:spLocks noGrp="1"/>
-          </p:cNvSpPr>
-          <p:nvPr>
-            <p:ph type="sldNum"/>
-          </p:nvPr>
-        </p:nvSpPr>
-        <p:spPr>
-          <a:xfrm>
-            <a:off x="6553080" y="6356520"/>
-            <a:ext cx="2133360" cy="364680"/>
-          </a:xfrm>
-          <a:prstGeom prst="rect">
-            <a:avLst/>
-          </a:prstGeom>
-        </p:spPr>
-        <p:txBody>
-          <a:bodyPr anchor="ctr"/>
-          <a:p>
-            <a:pPr algn="r">
-              <a:lnSpc>
-                <a:spcPct val="100000"/>
-              </a:lnSpc>
-            </a:pPr>
-            <a:fld id="{9C4CE608-65D9-49CB-AB12-36A44B1D52EF}" type="slidenum">
-              <a:rPr b="0" lang="en-IN" sz="1200" spc="-1" strike="noStrike">
-                <a:solidFill>
-                  <a:srgbClr val="888888"/>
-                </a:solidFill>
-                <a:uFill>
-                  <a:solidFill>
-                    <a:srgbClr val="ffffff"/>
-                  </a:solidFill>
-                </a:uFill>
-                <a:latin typeface="Calibri"/>
-                <a:ea typeface="Calibri"/>
-              </a:rPr>
-              <a:t>1</a:t>
-            </a:fld>
-            <a:endParaRPr b="0" lang="en-IN" sz="1400" spc="-1" strike="noStrike">
-              <a:solidFill>
-                <a:srgbClr val="000000"/>
-              </a:solidFill>
-              <a:uFill>
-                <a:solidFill>
-                  <a:srgbClr val="ffffff"/>
-                </a:solidFill>
-              </a:uFill>
-              <a:latin typeface="Times New Roman"/>
+            <a:endParaRPr b="0" lang="en-IN" sz="2000" spc="-1" strike="noStrike">
+              <a:solidFill>
+                <a:srgbClr val="000000"/>
+              </a:solidFill>
+              <a:uFill>
+                <a:solidFill>
+                  <a:srgbClr val="ffffff"/>
+                </a:solidFill>
+              </a:uFill>
+              <a:latin typeface="Arial"/>
             </a:endParaRPr>
           </a:p>
         </p:txBody>
@@ -3446,135 +3358,7 @@
       </p:grpSpPr>
       <p:sp>
         <p:nvSpPr>
-          <p:cNvPr id="39" name="PlaceHolder 1"/>
-          <p:cNvSpPr>
-            <a:spLocks noGrp="1"/>
-          </p:cNvSpPr>
-          <p:nvPr>
-            <p:ph type="dt"/>
-          </p:nvPr>
-        </p:nvSpPr>
-        <p:spPr>
-          <a:xfrm>
-            <a:off x="457200" y="6356520"/>
-            <a:ext cx="2133360" cy="364680"/>
-          </a:xfrm>
-          <a:prstGeom prst="rect">
-            <a:avLst/>
-          </a:prstGeom>
-        </p:spPr>
-        <p:txBody>
-          <a:bodyPr anchor="ctr"/>
-          <a:p>
-            <a:endParaRPr b="0" lang="en-IN" sz="2400" spc="-1" strike="noStrike">
-              <a:solidFill>
-                <a:srgbClr val="000000"/>
-              </a:solidFill>
-              <a:uFill>
-                <a:solidFill>
-                  <a:srgbClr val="ffffff"/>
-                </a:solidFill>
-              </a:uFill>
-              <a:latin typeface="Times New Roman"/>
-            </a:endParaRPr>
-          </a:p>
-        </p:txBody>
-      </p:sp>
-      <p:sp>
-        <p:nvSpPr>
-          <p:cNvPr id="40" name="PlaceHolder 2"/>
-          <p:cNvSpPr>
-            <a:spLocks noGrp="1"/>
-          </p:cNvSpPr>
-          <p:nvPr>
-            <p:ph type="ftr"/>
-          </p:nvPr>
-        </p:nvSpPr>
-        <p:spPr>
-          <a:xfrm>
-            <a:off x="3124080" y="6356520"/>
-            <a:ext cx="2895120" cy="364680"/>
-          </a:xfrm>
-          <a:prstGeom prst="rect">
-            <a:avLst/>
-          </a:prstGeom>
-        </p:spPr>
-        <p:txBody>
-          <a:bodyPr anchor="ctr"/>
-          <a:p>
-            <a:endParaRPr b="0" lang="en-IN" sz="2400" spc="-1" strike="noStrike">
-              <a:solidFill>
-                <a:srgbClr val="000000"/>
-              </a:solidFill>
-              <a:uFill>
-                <a:solidFill>
-                  <a:srgbClr val="ffffff"/>
-                </a:solidFill>
-              </a:uFill>
-              <a:latin typeface="Times New Roman"/>
-            </a:endParaRPr>
-          </a:p>
-        </p:txBody>
-      </p:sp>
-      <p:sp>
-        <p:nvSpPr>
-          <p:cNvPr id="41" name="PlaceHolder 3"/>
-          <p:cNvSpPr>
-            <a:spLocks noGrp="1"/>
-          </p:cNvSpPr>
-          <p:nvPr>
-            <p:ph type="sldNum"/>
-          </p:nvPr>
-        </p:nvSpPr>
-        <p:spPr>
-          <a:xfrm>
-            <a:off x="6553080" y="6356520"/>
-            <a:ext cx="2133360" cy="364680"/>
-          </a:xfrm>
-          <a:prstGeom prst="rect">
-            <a:avLst/>
-          </a:prstGeom>
-        </p:spPr>
-        <p:txBody>
-          <a:bodyPr anchor="ctr"/>
-          <a:p>
-            <a:pPr algn="r">
-              <a:lnSpc>
-                <a:spcPct val="100000"/>
-              </a:lnSpc>
-            </a:pPr>
-            <a:fld id="{3FC63243-EE9B-4D49-98C8-155B0808CC2F}" type="slidenum">
-              <a:rPr b="0" lang="en-IN" sz="1200" spc="-1" strike="noStrike">
-                <a:solidFill>
-                  <a:srgbClr val="888888"/>
-                </a:solidFill>
-                <a:uFill>
-                  <a:solidFill>
-                    <a:srgbClr val="ffffff"/>
-                  </a:solidFill>
-                </a:uFill>
-                <a:latin typeface="Calibri"/>
-                <a:ea typeface="Calibri"/>
-              </a:rPr>
-              <a:t>1</a:t>
-            </a:fld>
-            <a:endParaRPr b="0" lang="en-IN" sz="1400" spc="-1" strike="noStrike">
-              <a:solidFill>
-                <a:srgbClr val="000000"/>
-              </a:solidFill>
-              <a:uFill>
-                <a:solidFill>
-                  <a:srgbClr val="ffffff"/>
-                </a:solidFill>
-              </a:uFill>
-              <a:latin typeface="Times New Roman"/>
-            </a:endParaRPr>
-          </a:p>
-        </p:txBody>
-      </p:sp>
-      <p:sp>
-        <p:nvSpPr>
-          <p:cNvPr id="42" name="PlaceHolder 4"/>
+          <p:cNvPr id="36" name="PlaceHolder 1"/>
           <p:cNvSpPr>
             <a:spLocks noGrp="1"/>
           </p:cNvSpPr>
@@ -3594,8 +3378,9 @@
         <p:txBody>
           <a:bodyPr lIns="0" rIns="0" tIns="0" bIns="0" anchor="ctr"/>
           <a:p>
+            <a:pPr algn="ctr"/>
             <a:r>
-              <a:rPr b="0" lang="en-IN" sz="1400" spc="-1" strike="noStrike">
+              <a:rPr b="0" lang="en-IN" sz="4400" spc="-1" strike="noStrike">
                 <a:solidFill>
                   <a:srgbClr val="000000"/>
                 </a:solidFill>
@@ -3608,23 +3393,23 @@
               </a:rPr>
               <a:t>Click to edit the title text format</a:t>
             </a:r>
-            <a:endParaRPr b="0" lang="en-IN" sz="1400" spc="-1" strike="noStrike">
-              <a:solidFill>
-                <a:srgbClr val="000000"/>
-              </a:solidFill>
-              <a:uFill>
-                <a:solidFill>
-                  <a:srgbClr val="ffffff"/>
-                </a:solidFill>
-              </a:uFill>
-              <a:latin typeface="Arial"/>
-            </a:endParaRPr>
-          </a:p>
-        </p:txBody>
-      </p:sp>
-      <p:sp>
-        <p:nvSpPr>
-          <p:cNvPr id="43" name="PlaceHolder 5"/>
+            <a:endParaRPr b="0" lang="en-IN" sz="4400" spc="-1" strike="noStrike">
+              <a:solidFill>
+                <a:srgbClr val="000000"/>
+              </a:solidFill>
+              <a:uFill>
+                <a:solidFill>
+                  <a:srgbClr val="ffffff"/>
+                </a:solidFill>
+              </a:uFill>
+              <a:latin typeface="Arial"/>
+            </a:endParaRPr>
+          </a:p>
+        </p:txBody>
+      </p:sp>
+      <p:sp>
+        <p:nvSpPr>
+          <p:cNvPr id="37" name="PlaceHolder 2"/>
           <p:cNvSpPr>
             <a:spLocks noGrp="1"/>
           </p:cNvSpPr>
@@ -3653,7 +3438,7 @@
               <a:buChar char=""/>
             </a:pPr>
             <a:r>
-              <a:rPr b="0" lang="en-IN" sz="1400" spc="-1" strike="noStrike">
+              <a:rPr b="0" lang="en-IN" sz="3200" spc="-1" strike="noStrike">
                 <a:solidFill>
                   <a:srgbClr val="000000"/>
                 </a:solidFill>
@@ -3666,7 +3451,7 @@
               </a:rPr>
               <a:t>Click to edit the outline text format</a:t>
             </a:r>
-            <a:endParaRPr b="0" lang="en-IN" sz="1400" spc="-1" strike="noStrike">
+            <a:endParaRPr b="0" lang="en-IN" sz="3200" spc="-1" strike="noStrike">
               <a:solidFill>
                 <a:srgbClr val="000000"/>
               </a:solidFill>
@@ -3688,7 +3473,7 @@
               <a:buChar char=""/>
             </a:pPr>
             <a:r>
-              <a:rPr b="0" lang="en-IN" sz="1400" spc="-1" strike="noStrike">
+              <a:rPr b="0" lang="en-IN" sz="2800" spc="-1" strike="noStrike">
                 <a:solidFill>
                   <a:srgbClr val="000000"/>
                 </a:solidFill>
@@ -3701,7 +3486,7 @@
               </a:rPr>
               <a:t>Second Outline Level</a:t>
             </a:r>
-            <a:endParaRPr b="0" lang="en-IN" sz="1400" spc="-1" strike="noStrike">
+            <a:endParaRPr b="0" lang="en-IN" sz="2800" spc="-1" strike="noStrike">
               <a:solidFill>
                 <a:srgbClr val="000000"/>
               </a:solidFill>
@@ -3723,7 +3508,7 @@
               <a:buChar char=""/>
             </a:pPr>
             <a:r>
-              <a:rPr b="0" lang="en-IN" sz="1400" spc="-1" strike="noStrike">
+              <a:rPr b="0" lang="en-IN" sz="2400" spc="-1" strike="noStrike">
                 <a:solidFill>
                   <a:srgbClr val="000000"/>
                 </a:solidFill>
@@ -3736,7 +3521,7 @@
               </a:rPr>
               <a:t>Third Outline Level</a:t>
             </a:r>
-            <a:endParaRPr b="0" lang="en-IN" sz="1400" spc="-1" strike="noStrike">
+            <a:endParaRPr b="0" lang="en-IN" sz="2400" spc="-1" strike="noStrike">
               <a:solidFill>
                 <a:srgbClr val="000000"/>
               </a:solidFill>
@@ -3758,7 +3543,7 @@
               <a:buChar char=""/>
             </a:pPr>
             <a:r>
-              <a:rPr b="0" lang="en-IN" sz="1400" spc="-1" strike="noStrike">
+              <a:rPr b="0" lang="en-IN" sz="2000" spc="-1" strike="noStrike">
                 <a:solidFill>
                   <a:srgbClr val="000000"/>
                 </a:solidFill>
@@ -3771,7 +3556,7 @@
               </a:rPr>
               <a:t>Fourth Outline Level</a:t>
             </a:r>
-            <a:endParaRPr b="0" lang="en-IN" sz="1400" spc="-1" strike="noStrike">
+            <a:endParaRPr b="0" lang="en-IN" sz="2000" spc="-1" strike="noStrike">
               <a:solidFill>
                 <a:srgbClr val="000000"/>
               </a:solidFill>
@@ -3929,14 +3714,14 @@
       </p:grpSpPr>
       <p:sp>
         <p:nvSpPr>
-          <p:cNvPr id="78" name="CustomShape 1"/>
+          <p:cNvPr id="72" name="CustomShape 1"/>
           <p:cNvSpPr/>
           <p:nvPr/>
         </p:nvSpPr>
         <p:spPr>
           <a:xfrm>
             <a:off x="0" y="0"/>
-            <a:ext cx="8686440" cy="790920"/>
+            <a:ext cx="8685720" cy="790200"/>
           </a:xfrm>
           <a:prstGeom prst="rect">
             <a:avLst/>
@@ -3953,7 +3738,7 @@
           <a:fontRef idx="minor"/>
         </p:style>
         <p:txBody>
-          <a:bodyPr tIns="91440" bIns="91440"/>
+          <a:bodyPr lIns="90000" rIns="90000" tIns="91440" bIns="91440"/>
           <a:p>
             <a:pPr>
               <a:lnSpc>
@@ -4075,7 +3860,7 @@
       </p:sp>
       <p:pic>
         <p:nvPicPr>
-          <p:cNvPr id="79" name="" descr=""/>
+          <p:cNvPr id="73" name="" descr=""/>
           <p:cNvPicPr/>
           <p:nvPr/>
         </p:nvPicPr>
@@ -4086,7 +3871,7 @@
         <p:spPr>
           <a:xfrm>
             <a:off x="3637800" y="432000"/>
-            <a:ext cx="5362200" cy="5524200"/>
+            <a:ext cx="5361480" cy="5523480"/>
           </a:xfrm>
           <a:prstGeom prst="rect">
             <a:avLst/>
@@ -4147,14 +3932,14 @@
       </p:grpSpPr>
       <p:sp>
         <p:nvSpPr>
-          <p:cNvPr id="80" name="CustomShape 1"/>
+          <p:cNvPr id="74" name="CustomShape 1"/>
           <p:cNvSpPr/>
           <p:nvPr/>
         </p:nvSpPr>
         <p:spPr>
           <a:xfrm>
             <a:off x="0" y="0"/>
-            <a:ext cx="8686440" cy="790920"/>
+            <a:ext cx="8685720" cy="790200"/>
           </a:xfrm>
           <a:prstGeom prst="rect">
             <a:avLst/>
@@ -4171,7 +3956,7 @@
           <a:fontRef idx="minor"/>
         </p:style>
         <p:txBody>
-          <a:bodyPr tIns="91440" bIns="91440"/>
+          <a:bodyPr lIns="90000" rIns="90000" tIns="91440" bIns="91440"/>
           <a:p>
             <a:pPr>
               <a:lnSpc>
@@ -4260,7 +4045,7 @@
       </p:sp>
       <p:pic>
         <p:nvPicPr>
-          <p:cNvPr id="81" name="" descr=""/>
+          <p:cNvPr id="75" name="" descr=""/>
           <p:cNvPicPr/>
           <p:nvPr/>
         </p:nvPicPr>
@@ -4271,7 +4056,7 @@
         <p:spPr>
           <a:xfrm>
             <a:off x="2576880" y="847800"/>
-            <a:ext cx="5343120" cy="5200200"/>
+            <a:ext cx="5342400" cy="5199480"/>
           </a:xfrm>
           <a:prstGeom prst="rect">
             <a:avLst/>
@@ -4332,14 +4117,14 @@
       </p:grpSpPr>
       <p:sp>
         <p:nvSpPr>
-          <p:cNvPr id="82" name="CustomShape 1"/>
+          <p:cNvPr id="76" name="CustomShape 1"/>
           <p:cNvSpPr/>
           <p:nvPr/>
         </p:nvSpPr>
         <p:spPr>
           <a:xfrm>
             <a:off x="0" y="0"/>
-            <a:ext cx="8686440" cy="790920"/>
+            <a:ext cx="8685720" cy="790200"/>
           </a:xfrm>
           <a:prstGeom prst="rect">
             <a:avLst/>
@@ -4356,7 +4141,7 @@
           <a:fontRef idx="minor"/>
         </p:style>
         <p:txBody>
-          <a:bodyPr tIns="91440" bIns="91440"/>
+          <a:bodyPr lIns="90000" rIns="90000" tIns="91440" bIns="91440"/>
           <a:p>
             <a:pPr>
               <a:lnSpc>
@@ -4445,7 +4230,7 @@
       </p:sp>
       <p:pic>
         <p:nvPicPr>
-          <p:cNvPr id="83" name="" descr=""/>
+          <p:cNvPr id="77" name="" descr=""/>
           <p:cNvPicPr/>
           <p:nvPr/>
         </p:nvPicPr>
@@ -4456,7 +4241,7 @@
         <p:spPr>
           <a:xfrm>
             <a:off x="1872000" y="790920"/>
-            <a:ext cx="5447880" cy="5524200"/>
+            <a:ext cx="5447160" cy="5523480"/>
           </a:xfrm>
           <a:prstGeom prst="rect">
             <a:avLst/>
@@ -4515,9 +4300,176 @@
           <a:chExt cx="0" cy="0"/>
         </a:xfrm>
       </p:grpSpPr>
+      <p:sp>
+        <p:nvSpPr>
+          <p:cNvPr id="78" name="CustomShape 1"/>
+          <p:cNvSpPr/>
+          <p:nvPr/>
+        </p:nvSpPr>
+        <p:spPr>
+          <a:xfrm>
+            <a:off x="0" y="0"/>
+            <a:ext cx="8685720" cy="790200"/>
+          </a:xfrm>
+          <a:prstGeom prst="rect">
+            <a:avLst/>
+          </a:prstGeom>
+          <a:noFill/>
+          <a:ln>
+            <a:noFill/>
+          </a:ln>
+        </p:spPr>
+        <p:style>
+          <a:lnRef idx="0"/>
+          <a:fillRef idx="0"/>
+          <a:effectRef idx="0"/>
+          <a:fontRef idx="minor"/>
+        </p:style>
+        <p:txBody>
+          <a:bodyPr lIns="90000" rIns="90000" tIns="91440" bIns="91440"/>
+          <a:p>
+            <a:pPr>
+              <a:lnSpc>
+                <a:spcPct val="100000"/>
+              </a:lnSpc>
+            </a:pPr>
+            <a:r>
+              <a:rPr b="0" lang="en-IN" sz="3000" spc="-1" strike="noStrike">
+                <a:solidFill>
+                  <a:srgbClr val="2c0ee0"/>
+                </a:solidFill>
+                <a:uFill>
+                  <a:solidFill>
+                    <a:srgbClr val="ffffff"/>
+                  </a:solidFill>
+                </a:uFill>
+                <a:latin typeface="Times New Roman"/>
+                <a:ea typeface="Times New Roman"/>
+              </a:rPr>
+              <a:t>Dougman Casia Version 1:</a:t>
+            </a:r>
+            <a:endParaRPr b="0" lang="en-IN" sz="1800" spc="-1" strike="noStrike">
+              <a:solidFill>
+                <a:srgbClr val="000000"/>
+              </a:solidFill>
+              <a:uFill>
+                <a:solidFill>
+                  <a:srgbClr val="ffffff"/>
+                </a:solidFill>
+              </a:uFill>
+              <a:latin typeface="Arial"/>
+            </a:endParaRPr>
+          </a:p>
+          <a:p>
+            <a:pPr>
+              <a:lnSpc>
+                <a:spcPct val="100000"/>
+              </a:lnSpc>
+            </a:pPr>
+            <a:endParaRPr b="0" lang="en-IN" sz="1800" spc="-1" strike="noStrike">
+              <a:solidFill>
+                <a:srgbClr val="000000"/>
+              </a:solidFill>
+              <a:uFill>
+                <a:solidFill>
+                  <a:srgbClr val="ffffff"/>
+                </a:solidFill>
+              </a:uFill>
+              <a:latin typeface="Arial"/>
+            </a:endParaRPr>
+          </a:p>
+          <a:p>
+            <a:pPr>
+              <a:lnSpc>
+                <a:spcPct val="100000"/>
+              </a:lnSpc>
+            </a:pPr>
+            <a:endParaRPr b="0" lang="en-IN" sz="1800" spc="-1" strike="noStrike">
+              <a:solidFill>
+                <a:srgbClr val="000000"/>
+              </a:solidFill>
+              <a:uFill>
+                <a:solidFill>
+                  <a:srgbClr val="ffffff"/>
+                </a:solidFill>
+              </a:uFill>
+              <a:latin typeface="Arial"/>
+            </a:endParaRPr>
+          </a:p>
+          <a:p>
+            <a:pPr>
+              <a:lnSpc>
+                <a:spcPct val="100000"/>
+              </a:lnSpc>
+            </a:pPr>
+            <a:endParaRPr b="0" lang="en-IN" sz="1800" spc="-1" strike="noStrike">
+              <a:solidFill>
+                <a:srgbClr val="000000"/>
+              </a:solidFill>
+              <a:uFill>
+                <a:solidFill>
+                  <a:srgbClr val="ffffff"/>
+                </a:solidFill>
+              </a:uFill>
+              <a:latin typeface="Arial"/>
+            </a:endParaRPr>
+          </a:p>
+          <a:p>
+            <a:pPr>
+              <a:lnSpc>
+                <a:spcPct val="100000"/>
+              </a:lnSpc>
+            </a:pPr>
+            <a:endParaRPr b="0" lang="en-IN" sz="1800" spc="-1" strike="noStrike">
+              <a:solidFill>
+                <a:srgbClr val="000000"/>
+              </a:solidFill>
+              <a:uFill>
+                <a:solidFill>
+                  <a:srgbClr val="ffffff"/>
+                </a:solidFill>
+              </a:uFill>
+              <a:latin typeface="Arial"/>
+            </a:endParaRPr>
+          </a:p>
+          <a:p>
+            <a:pPr>
+              <a:lnSpc>
+                <a:spcPct val="100000"/>
+              </a:lnSpc>
+            </a:pPr>
+            <a:r>
+              <a:rPr b="0" lang="en-IN" sz="3000" spc="-1" strike="noStrike">
+                <a:solidFill>
+                  <a:srgbClr val="2c0ee0"/>
+                </a:solidFill>
+                <a:uFill>
+                  <a:solidFill>
+                    <a:srgbClr val="ffffff"/>
+                  </a:solidFill>
+                </a:uFill>
+                <a:latin typeface="Times New Roman"/>
+                <a:ea typeface="Times New Roman"/>
+              </a:rPr>
+              <a:t> </a:t>
+            </a:r>
+            <a:endParaRPr b="0" lang="en-IN" sz="1800" spc="-1" strike="noStrike">
+              <a:solidFill>
+                <a:srgbClr val="000000"/>
+              </a:solidFill>
+              <a:uFill>
+                <a:solidFill>
+                  <a:srgbClr val="ffffff"/>
+                </a:solidFill>
+              </a:uFill>
+              <a:latin typeface="Arial"/>
+            </a:endParaRPr>
+          </a:p>
+        </p:txBody>
+      </p:sp>
       <p:pic>
         <p:nvPicPr>
-          <p:cNvPr id="84" name="Google Shape;178;p13" descr=""/>
+          <p:cNvPr id="79" name="" descr=""/>
           <p:cNvPicPr/>
           <p:nvPr/>
         </p:nvPicPr>
@@ -4527,8 +4479,8 @@
         </p:blipFill>
         <p:spPr>
           <a:xfrm>
-            <a:off x="2205000" y="1652760"/>
-            <a:ext cx="4733640" cy="3552480"/>
+            <a:off x="1886040" y="781200"/>
+            <a:ext cx="5673600" cy="5592960"/>
           </a:xfrm>
           <a:prstGeom prst="rect">
             <a:avLst/>
@@ -4547,6 +4499,820 @@
           <p:childTnLst>
             <p:seq>
               <p:cTn id="8" nodeType="mainSeq"/>
+              <p:prevCondLst>
+                <p:cond delay="0" evt="onPrev">
+                  <p:tgtEl>
+                    <p:sldTgt/>
+                  </p:tgtEl>
+                </p:cond>
+              </p:prevCondLst>
+              <p:nextCondLst>
+                <p:cond delay="0" evt="onNext">
+                  <p:tgtEl>
+                    <p:sldTgt/>
+                  </p:tgtEl>
+                </p:cond>
+              </p:nextCondLst>
+            </p:seq>
+          </p:childTnLst>
+        </p:cTn>
+      </p:par>
+    </p:tnLst>
+  </p:timing>
+</p:sld>
+</file>
+
+<file path=ppt/slides/slide5.xml><?xml version="1.0" encoding="utf-8"?>
+<p:sld xmlns:a="http://schemas.openxmlformats.org/drawingml/2006/main" xmlns:p="http://schemas.openxmlformats.org/presentationml/2006/main" xmlns:r="http://schemas.openxmlformats.org/officeDocument/2006/relationships" xmlns:p14="http://schemas.microsoft.com/office/powerpoint/2010/main" xmlns:p15="http://schemas.microsoft.com/office/powerpoint/2012/main" xmlns:mc="http://schemas.openxmlformats.org/markup-compatibility/2006">
+  <p:cSld>
+    <p:spTree>
+      <p:nvGrpSpPr>
+        <p:cNvPr id="1" name=""/>
+        <p:cNvGrpSpPr/>
+        <p:nvPr/>
+      </p:nvGrpSpPr>
+      <p:grpSpPr>
+        <a:xfrm>
+          <a:off x="0" y="0"/>
+          <a:ext cx="0" cy="0"/>
+          <a:chOff x="0" y="0"/>
+          <a:chExt cx="0" cy="0"/>
+        </a:xfrm>
+      </p:grpSpPr>
+      <p:sp>
+        <p:nvSpPr>
+          <p:cNvPr id="80" name="CustomShape 1"/>
+          <p:cNvSpPr/>
+          <p:nvPr/>
+        </p:nvSpPr>
+        <p:spPr>
+          <a:xfrm>
+            <a:off x="0" y="0"/>
+            <a:ext cx="8685720" cy="790200"/>
+          </a:xfrm>
+          <a:prstGeom prst="rect">
+            <a:avLst/>
+          </a:prstGeom>
+          <a:noFill/>
+          <a:ln>
+            <a:noFill/>
+          </a:ln>
+        </p:spPr>
+        <p:style>
+          <a:lnRef idx="0"/>
+          <a:fillRef idx="0"/>
+          <a:effectRef idx="0"/>
+          <a:fontRef idx="minor"/>
+        </p:style>
+        <p:txBody>
+          <a:bodyPr lIns="90000" rIns="90000" tIns="91440" bIns="91440"/>
+          <a:p>
+            <a:pPr>
+              <a:lnSpc>
+                <a:spcPct val="100000"/>
+              </a:lnSpc>
+            </a:pPr>
+            <a:r>
+              <a:rPr b="0" lang="en-IN" sz="3000" spc="-1" strike="noStrike">
+                <a:solidFill>
+                  <a:srgbClr val="2c0ee0"/>
+                </a:solidFill>
+                <a:uFill>
+                  <a:solidFill>
+                    <a:srgbClr val="ffffff"/>
+                  </a:solidFill>
+                </a:uFill>
+                <a:latin typeface="Times New Roman"/>
+                <a:ea typeface="Times New Roman"/>
+              </a:rPr>
+              <a:t>Influence of segmentation on deep iris recognition</a:t>
+            </a:r>
+            <a:endParaRPr b="0" lang="en-IN" sz="1800" spc="-1" strike="noStrike">
+              <a:solidFill>
+                <a:srgbClr val="000000"/>
+              </a:solidFill>
+              <a:uFill>
+                <a:solidFill>
+                  <a:srgbClr val="ffffff"/>
+                </a:solidFill>
+              </a:uFill>
+              <a:latin typeface="Arial"/>
+            </a:endParaRPr>
+          </a:p>
+          <a:p>
+            <a:pPr>
+              <a:lnSpc>
+                <a:spcPct val="100000"/>
+              </a:lnSpc>
+            </a:pPr>
+            <a:r>
+              <a:rPr b="0" lang="en-IN" sz="3000" spc="-1" strike="noStrike">
+                <a:solidFill>
+                  <a:srgbClr val="2c0ee0"/>
+                </a:solidFill>
+                <a:uFill>
+                  <a:solidFill>
+                    <a:srgbClr val="ffffff"/>
+                  </a:solidFill>
+                </a:uFill>
+                <a:latin typeface="Times New Roman"/>
+                <a:ea typeface="Times New Roman"/>
+              </a:rPr>
+              <a:t>Performance:</a:t>
+            </a:r>
+            <a:endParaRPr b="0" lang="en-IN" sz="1800" spc="-1" strike="noStrike">
+              <a:solidFill>
+                <a:srgbClr val="000000"/>
+              </a:solidFill>
+              <a:uFill>
+                <a:solidFill>
+                  <a:srgbClr val="ffffff"/>
+                </a:solidFill>
+              </a:uFill>
+              <a:latin typeface="Arial"/>
+            </a:endParaRPr>
+          </a:p>
+          <a:p>
+            <a:pPr>
+              <a:lnSpc>
+                <a:spcPct val="100000"/>
+              </a:lnSpc>
+            </a:pPr>
+            <a:endParaRPr b="0" lang="en-IN" sz="1800" spc="-1" strike="noStrike">
+              <a:solidFill>
+                <a:srgbClr val="000000"/>
+              </a:solidFill>
+              <a:uFill>
+                <a:solidFill>
+                  <a:srgbClr val="ffffff"/>
+                </a:solidFill>
+              </a:uFill>
+              <a:latin typeface="Arial"/>
+            </a:endParaRPr>
+          </a:p>
+          <a:p>
+            <a:pPr>
+              <a:lnSpc>
+                <a:spcPct val="100000"/>
+              </a:lnSpc>
+            </a:pPr>
+            <a:endParaRPr b="0" lang="en-IN" sz="1800" spc="-1" strike="noStrike">
+              <a:solidFill>
+                <a:srgbClr val="000000"/>
+              </a:solidFill>
+              <a:uFill>
+                <a:solidFill>
+                  <a:srgbClr val="ffffff"/>
+                </a:solidFill>
+              </a:uFill>
+              <a:latin typeface="Arial"/>
+            </a:endParaRPr>
+          </a:p>
+          <a:p>
+            <a:pPr>
+              <a:lnSpc>
+                <a:spcPct val="100000"/>
+              </a:lnSpc>
+            </a:pPr>
+            <a:endParaRPr b="0" lang="en-IN" sz="1800" spc="-1" strike="noStrike">
+              <a:solidFill>
+                <a:srgbClr val="000000"/>
+              </a:solidFill>
+              <a:uFill>
+                <a:solidFill>
+                  <a:srgbClr val="ffffff"/>
+                </a:solidFill>
+              </a:uFill>
+              <a:latin typeface="Arial"/>
+            </a:endParaRPr>
+          </a:p>
+          <a:p>
+            <a:pPr>
+              <a:lnSpc>
+                <a:spcPct val="100000"/>
+              </a:lnSpc>
+            </a:pPr>
+            <a:endParaRPr b="0" lang="en-IN" sz="1800" spc="-1" strike="noStrike">
+              <a:solidFill>
+                <a:srgbClr val="000000"/>
+              </a:solidFill>
+              <a:uFill>
+                <a:solidFill>
+                  <a:srgbClr val="ffffff"/>
+                </a:solidFill>
+              </a:uFill>
+              <a:latin typeface="Arial"/>
+            </a:endParaRPr>
+          </a:p>
+          <a:p>
+            <a:pPr>
+              <a:lnSpc>
+                <a:spcPct val="100000"/>
+              </a:lnSpc>
+            </a:pPr>
+            <a:endParaRPr b="0" lang="en-IN" sz="1800" spc="-1" strike="noStrike">
+              <a:solidFill>
+                <a:srgbClr val="000000"/>
+              </a:solidFill>
+              <a:uFill>
+                <a:solidFill>
+                  <a:srgbClr val="ffffff"/>
+                </a:solidFill>
+              </a:uFill>
+              <a:latin typeface="Arial"/>
+            </a:endParaRPr>
+          </a:p>
+          <a:p>
+            <a:pPr>
+              <a:lnSpc>
+                <a:spcPct val="100000"/>
+              </a:lnSpc>
+            </a:pPr>
+            <a:endParaRPr b="0" lang="en-IN" sz="1800" spc="-1" strike="noStrike">
+              <a:solidFill>
+                <a:srgbClr val="000000"/>
+              </a:solidFill>
+              <a:uFill>
+                <a:solidFill>
+                  <a:srgbClr val="ffffff"/>
+                </a:solidFill>
+              </a:uFill>
+              <a:latin typeface="Arial"/>
+            </a:endParaRPr>
+          </a:p>
+          <a:p>
+            <a:pPr>
+              <a:lnSpc>
+                <a:spcPct val="100000"/>
+              </a:lnSpc>
+            </a:pPr>
+            <a:endParaRPr b="0" lang="en-IN" sz="1800" spc="-1" strike="noStrike">
+              <a:solidFill>
+                <a:srgbClr val="000000"/>
+              </a:solidFill>
+              <a:uFill>
+                <a:solidFill>
+                  <a:srgbClr val="ffffff"/>
+                </a:solidFill>
+              </a:uFill>
+              <a:latin typeface="Arial"/>
+            </a:endParaRPr>
+          </a:p>
+          <a:p>
+            <a:pPr>
+              <a:lnSpc>
+                <a:spcPct val="100000"/>
+              </a:lnSpc>
+            </a:pPr>
+            <a:r>
+              <a:rPr b="0" lang="en-IN" sz="3000" spc="-1" strike="noStrike">
+                <a:solidFill>
+                  <a:srgbClr val="2c0ee0"/>
+                </a:solidFill>
+                <a:uFill>
+                  <a:solidFill>
+                    <a:srgbClr val="ffffff"/>
+                  </a:solidFill>
+                </a:uFill>
+                <a:latin typeface="Times New Roman"/>
+                <a:ea typeface="Times New Roman"/>
+              </a:rPr>
+              <a:t> </a:t>
+            </a:r>
+            <a:endParaRPr b="0" lang="en-IN" sz="1800" spc="-1" strike="noStrike">
+              <a:solidFill>
+                <a:srgbClr val="000000"/>
+              </a:solidFill>
+              <a:uFill>
+                <a:solidFill>
+                  <a:srgbClr val="ffffff"/>
+                </a:solidFill>
+              </a:uFill>
+              <a:latin typeface="Arial"/>
+            </a:endParaRPr>
+          </a:p>
+        </p:txBody>
+      </p:sp>
+      <p:sp>
+        <p:nvSpPr>
+          <p:cNvPr id="81" name="CustomShape 2"/>
+          <p:cNvSpPr/>
+          <p:nvPr/>
+        </p:nvSpPr>
+        <p:spPr>
+          <a:xfrm>
+            <a:off x="288000" y="4597920"/>
+            <a:ext cx="8665200" cy="1881720"/>
+          </a:xfrm>
+          <a:prstGeom prst="rect">
+            <a:avLst/>
+          </a:prstGeom>
+          <a:noFill/>
+          <a:ln>
+            <a:noFill/>
+          </a:ln>
+        </p:spPr>
+        <p:style>
+          <a:lnRef idx="0"/>
+          <a:fillRef idx="0"/>
+          <a:effectRef idx="0"/>
+          <a:fontRef idx="minor"/>
+        </p:style>
+        <p:txBody>
+          <a:bodyPr lIns="90000" rIns="90000" tIns="45000" bIns="45000"/>
+          <a:p>
+            <a:r>
+              <a:rPr b="0" lang="en-IN" sz="1800" spc="-1" strike="noStrike">
+                <a:solidFill>
+                  <a:srgbClr val="000000"/>
+                </a:solidFill>
+                <a:uFill>
+                  <a:solidFill>
+                    <a:srgbClr val="ffffff"/>
+                  </a:solidFill>
+                </a:uFill>
+                <a:latin typeface="Arial"/>
+              </a:rPr>
+              <a:t>Casia 1000 data set : </a:t>
+            </a:r>
+            <a:endParaRPr b="0" lang="en-IN" sz="1800" spc="-1" strike="noStrike">
+              <a:solidFill>
+                <a:srgbClr val="000000"/>
+              </a:solidFill>
+              <a:uFill>
+                <a:solidFill>
+                  <a:srgbClr val="ffffff"/>
+                </a:solidFill>
+              </a:uFill>
+              <a:latin typeface="Arial"/>
+            </a:endParaRPr>
+          </a:p>
+          <a:p>
+            <a:r>
+              <a:rPr b="0" lang="en-IN" sz="1800" spc="-1" strike="noStrike">
+                <a:solidFill>
+                  <a:srgbClr val="000000"/>
+                </a:solidFill>
+                <a:uFill>
+                  <a:solidFill>
+                    <a:srgbClr val="ffffff"/>
+                  </a:solidFill>
+                </a:uFill>
+                <a:latin typeface="Arial"/>
+              </a:rPr>
+              <a:t>220  images are used to train the segmentation part of our pipeline, and are further split between the actual training (154 images) and the validation data (66 images)</a:t>
+            </a:r>
+            <a:endParaRPr b="0" lang="en-IN" sz="1800" spc="-1" strike="noStrike">
+              <a:solidFill>
+                <a:srgbClr val="000000"/>
+              </a:solidFill>
+              <a:uFill>
+                <a:solidFill>
+                  <a:srgbClr val="ffffff"/>
+                </a:solidFill>
+              </a:uFill>
+              <a:latin typeface="Arial"/>
+            </a:endParaRPr>
+          </a:p>
+          <a:p>
+            <a:endParaRPr b="0" lang="en-IN" sz="1800" spc="-1" strike="noStrike">
+              <a:solidFill>
+                <a:srgbClr val="000000"/>
+              </a:solidFill>
+              <a:uFill>
+                <a:solidFill>
+                  <a:srgbClr val="ffffff"/>
+                </a:solidFill>
+              </a:uFill>
+              <a:latin typeface="Arial"/>
+            </a:endParaRPr>
+          </a:p>
+          <a:p>
+            <a:r>
+              <a:rPr b="0" lang="en-IN" sz="1800" spc="-1" strike="noStrike">
+                <a:solidFill>
+                  <a:srgbClr val="000000"/>
+                </a:solidFill>
+                <a:uFill>
+                  <a:solidFill>
+                    <a:srgbClr val="ffffff"/>
+                  </a:solidFill>
+                </a:uFill>
+                <a:latin typeface="Arial"/>
+              </a:rPr>
+              <a:t>SBVPI 110 data set: </a:t>
+            </a:r>
+            <a:endParaRPr b="0" lang="en-IN" sz="1800" spc="-1" strike="noStrike">
+              <a:solidFill>
+                <a:srgbClr val="000000"/>
+              </a:solidFill>
+              <a:uFill>
+                <a:solidFill>
+                  <a:srgbClr val="ffffff"/>
+                </a:solidFill>
+              </a:uFill>
+              <a:latin typeface="Arial"/>
+            </a:endParaRPr>
+          </a:p>
+          <a:p>
+            <a:r>
+              <a:rPr b="0" lang="en-IN" sz="1800" spc="-1" strike="noStrike">
+                <a:solidFill>
+                  <a:srgbClr val="000000"/>
+                </a:solidFill>
+                <a:uFill>
+                  <a:solidFill>
+                    <a:srgbClr val="ffffff"/>
+                  </a:solidFill>
+                </a:uFill>
+                <a:latin typeface="Arial"/>
+              </a:rPr>
+              <a:t>332 image are use for training the segmentation part of our pipeline and 58 these are used for validation.</a:t>
+            </a:r>
+            <a:endParaRPr b="0" lang="en-IN" sz="1800" spc="-1" strike="noStrike">
+              <a:solidFill>
+                <a:srgbClr val="000000"/>
+              </a:solidFill>
+              <a:uFill>
+                <a:solidFill>
+                  <a:srgbClr val="ffffff"/>
+                </a:solidFill>
+              </a:uFill>
+              <a:latin typeface="Arial"/>
+            </a:endParaRPr>
+          </a:p>
+        </p:txBody>
+      </p:sp>
+      <p:pic>
+        <p:nvPicPr>
+          <p:cNvPr id="82" name="" descr=""/>
+          <p:cNvPicPr/>
+          <p:nvPr/>
+        </p:nvPicPr>
+        <p:blipFill>
+          <a:blip r:embed="rId1"/>
+          <a:stretch/>
+        </p:blipFill>
+        <p:spPr>
+          <a:xfrm>
+            <a:off x="432000" y="1224000"/>
+            <a:ext cx="7800120" cy="2980440"/>
+          </a:xfrm>
+          <a:prstGeom prst="rect">
+            <a:avLst/>
+          </a:prstGeom>
+          <a:ln>
+            <a:noFill/>
+          </a:ln>
+        </p:spPr>
+      </p:pic>
+    </p:spTree>
+  </p:cSld>
+  <p:timing>
+    <p:tnLst>
+      <p:par>
+        <p:cTn id="9" dur="indefinite" restart="never" nodeType="tmRoot">
+          <p:childTnLst>
+            <p:seq>
+              <p:cTn id="10" nodeType="mainSeq"/>
+              <p:prevCondLst>
+                <p:cond delay="0" evt="onPrev">
+                  <p:tgtEl>
+                    <p:sldTgt/>
+                  </p:tgtEl>
+                </p:cond>
+              </p:prevCondLst>
+              <p:nextCondLst>
+                <p:cond delay="0" evt="onNext">
+                  <p:tgtEl>
+                    <p:sldTgt/>
+                  </p:tgtEl>
+                </p:cond>
+              </p:nextCondLst>
+            </p:seq>
+          </p:childTnLst>
+        </p:cTn>
+      </p:par>
+    </p:tnLst>
+  </p:timing>
+</p:sld>
+</file>
+
+<file path=ppt/slides/slide6.xml><?xml version="1.0" encoding="utf-8"?>
+<p:sld xmlns:a="http://schemas.openxmlformats.org/drawingml/2006/main" xmlns:p="http://schemas.openxmlformats.org/presentationml/2006/main" xmlns:r="http://schemas.openxmlformats.org/officeDocument/2006/relationships" xmlns:p14="http://schemas.microsoft.com/office/powerpoint/2010/main" xmlns:p15="http://schemas.microsoft.com/office/powerpoint/2012/main" xmlns:mc="http://schemas.openxmlformats.org/markup-compatibility/2006">
+  <p:cSld>
+    <p:spTree>
+      <p:nvGrpSpPr>
+        <p:cNvPr id="1" name=""/>
+        <p:cNvGrpSpPr/>
+        <p:nvPr/>
+      </p:nvGrpSpPr>
+      <p:grpSpPr>
+        <a:xfrm>
+          <a:off x="0" y="0"/>
+          <a:ext cx="0" cy="0"/>
+          <a:chOff x="0" y="0"/>
+          <a:chExt cx="0" cy="0"/>
+        </a:xfrm>
+      </p:grpSpPr>
+      <p:pic>
+        <p:nvPicPr>
+          <p:cNvPr id="83" name="" descr=""/>
+          <p:cNvPicPr/>
+          <p:nvPr/>
+        </p:nvPicPr>
+        <p:blipFill>
+          <a:blip r:embed="rId1"/>
+          <a:stretch/>
+        </p:blipFill>
+        <p:spPr>
+          <a:xfrm>
+            <a:off x="5040000" y="432000"/>
+            <a:ext cx="3830400" cy="5787720"/>
+          </a:xfrm>
+          <a:prstGeom prst="rect">
+            <a:avLst/>
+          </a:prstGeom>
+          <a:ln>
+            <a:noFill/>
+          </a:ln>
+        </p:spPr>
+      </p:pic>
+      <p:pic>
+        <p:nvPicPr>
+          <p:cNvPr id="84" name="" descr=""/>
+          <p:cNvPicPr/>
+          <p:nvPr/>
+        </p:nvPicPr>
+        <p:blipFill>
+          <a:blip r:embed="rId2"/>
+          <a:stretch/>
+        </p:blipFill>
+        <p:spPr>
+          <a:xfrm>
+            <a:off x="530640" y="1562040"/>
+            <a:ext cx="4487400" cy="1893960"/>
+          </a:xfrm>
+          <a:prstGeom prst="rect">
+            <a:avLst/>
+          </a:prstGeom>
+          <a:ln>
+            <a:noFill/>
+          </a:ln>
+        </p:spPr>
+      </p:pic>
+    </p:spTree>
+  </p:cSld>
+  <p:timing>
+    <p:tnLst>
+      <p:par>
+        <p:cTn id="11" dur="indefinite" restart="never" nodeType="tmRoot">
+          <p:childTnLst>
+            <p:seq>
+              <p:cTn id="12" nodeType="mainSeq"/>
+              <p:prevCondLst>
+                <p:cond delay="0" evt="onPrev">
+                  <p:tgtEl>
+                    <p:sldTgt/>
+                  </p:tgtEl>
+                </p:cond>
+              </p:prevCondLst>
+              <p:nextCondLst>
+                <p:cond delay="0" evt="onNext">
+                  <p:tgtEl>
+                    <p:sldTgt/>
+                  </p:tgtEl>
+                </p:cond>
+              </p:nextCondLst>
+            </p:seq>
+          </p:childTnLst>
+        </p:cTn>
+      </p:par>
+    </p:tnLst>
+  </p:timing>
+</p:sld>
+</file>
+
+<file path=ppt/slides/slide7.xml><?xml version="1.0" encoding="utf-8"?>
+<p:sld xmlns:a="http://schemas.openxmlformats.org/drawingml/2006/main" xmlns:p="http://schemas.openxmlformats.org/presentationml/2006/main" xmlns:r="http://schemas.openxmlformats.org/officeDocument/2006/relationships" xmlns:p14="http://schemas.microsoft.com/office/powerpoint/2010/main" xmlns:p15="http://schemas.microsoft.com/office/powerpoint/2012/main" xmlns:mc="http://schemas.openxmlformats.org/markup-compatibility/2006">
+  <p:cSld>
+    <p:spTree>
+      <p:nvGrpSpPr>
+        <p:cNvPr id="1" name=""/>
+        <p:cNvGrpSpPr/>
+        <p:nvPr/>
+      </p:nvGrpSpPr>
+      <p:grpSpPr>
+        <a:xfrm>
+          <a:off x="0" y="0"/>
+          <a:ext cx="0" cy="0"/>
+          <a:chOff x="0" y="0"/>
+          <a:chExt cx="0" cy="0"/>
+        </a:xfrm>
+      </p:grpSpPr>
+      <p:sp>
+        <p:nvSpPr>
+          <p:cNvPr id="85" name="TextShape 1"/>
+          <p:cNvSpPr txBox="1"/>
+          <p:nvPr/>
+        </p:nvSpPr>
+        <p:spPr>
+          <a:xfrm>
+            <a:off x="288000" y="5544000"/>
+            <a:ext cx="8496000" cy="1114560"/>
+          </a:xfrm>
+          <a:prstGeom prst="rect">
+            <a:avLst/>
+          </a:prstGeom>
+          <a:noFill/>
+          <a:ln>
+            <a:noFill/>
+          </a:ln>
+        </p:spPr>
+        <p:txBody>
+          <a:bodyPr lIns="90000" rIns="90000" tIns="45000" bIns="45000"/>
+          <a:p>
+            <a:r>
+              <a:rPr b="0" lang="en-IN" sz="1800" spc="-1" strike="noStrike">
+                <a:solidFill>
+                  <a:srgbClr val="000000"/>
+                </a:solidFill>
+                <a:uFill>
+                  <a:solidFill>
+                    <a:srgbClr val="ffffff"/>
+                  </a:solidFill>
+                </a:uFill>
+                <a:latin typeface="Arial"/>
+              </a:rPr>
+              <a:t>We report results in terms of rank-1 and rank-5 identification accuracy and also plot Cumulative Match Characteristic (CMC) curves to provide more detailed insight into the experiments.</a:t>
+            </a:r>
+            <a:endParaRPr b="0" lang="en-IN" sz="1800" spc="-1" strike="noStrike">
+              <a:solidFill>
+                <a:srgbClr val="000000"/>
+              </a:solidFill>
+              <a:uFill>
+                <a:solidFill>
+                  <a:srgbClr val="ffffff"/>
+                </a:solidFill>
+              </a:uFill>
+              <a:latin typeface="Arial"/>
+            </a:endParaRPr>
+          </a:p>
+        </p:txBody>
+      </p:sp>
+      <p:pic>
+        <p:nvPicPr>
+          <p:cNvPr id="86" name="" descr=""/>
+          <p:cNvPicPr/>
+          <p:nvPr/>
+        </p:nvPicPr>
+        <p:blipFill>
+          <a:blip r:embed="rId1"/>
+          <a:stretch/>
+        </p:blipFill>
+        <p:spPr>
+          <a:xfrm>
+            <a:off x="1757880" y="590760"/>
+            <a:ext cx="6289920" cy="4665240"/>
+          </a:xfrm>
+          <a:prstGeom prst="rect">
+            <a:avLst/>
+          </a:prstGeom>
+          <a:ln>
+            <a:noFill/>
+          </a:ln>
+        </p:spPr>
+      </p:pic>
+    </p:spTree>
+  </p:cSld>
+  <p:timing>
+    <p:tnLst>
+      <p:par>
+        <p:cTn id="13" dur="indefinite" restart="never" nodeType="tmRoot">
+          <p:childTnLst>
+            <p:seq>
+              <p:cTn id="14" nodeType="mainSeq"/>
+              <p:prevCondLst>
+                <p:cond delay="0" evt="onPrev">
+                  <p:tgtEl>
+                    <p:sldTgt/>
+                  </p:tgtEl>
+                </p:cond>
+              </p:prevCondLst>
+              <p:nextCondLst>
+                <p:cond delay="0" evt="onNext">
+                  <p:tgtEl>
+                    <p:sldTgt/>
+                  </p:tgtEl>
+                </p:cond>
+              </p:nextCondLst>
+            </p:seq>
+          </p:childTnLst>
+        </p:cTn>
+      </p:par>
+    </p:tnLst>
+  </p:timing>
+</p:sld>
+</file>
+
+<file path=ppt/slides/slide8.xml><?xml version="1.0" encoding="utf-8"?>
+<p:sld xmlns:a="http://schemas.openxmlformats.org/drawingml/2006/main" xmlns:p="http://schemas.openxmlformats.org/presentationml/2006/main" xmlns:r="http://schemas.openxmlformats.org/officeDocument/2006/relationships" xmlns:p14="http://schemas.microsoft.com/office/powerpoint/2010/main" xmlns:p15="http://schemas.microsoft.com/office/powerpoint/2012/main" xmlns:mc="http://schemas.openxmlformats.org/markup-compatibility/2006">
+  <p:cSld>
+    <p:spTree>
+      <p:nvGrpSpPr>
+        <p:cNvPr id="1" name=""/>
+        <p:cNvGrpSpPr/>
+        <p:nvPr/>
+      </p:nvGrpSpPr>
+      <p:grpSpPr>
+        <a:xfrm>
+          <a:off x="0" y="0"/>
+          <a:ext cx="0" cy="0"/>
+          <a:chOff x="0" y="0"/>
+          <a:chExt cx="0" cy="0"/>
+        </a:xfrm>
+      </p:grpSpPr>
+    </p:spTree>
+  </p:cSld>
+  <p:timing>
+    <p:tnLst>
+      <p:par>
+        <p:cTn id="15" dur="indefinite" restart="never" nodeType="tmRoot">
+          <p:childTnLst>
+            <p:seq>
+              <p:cTn id="16" nodeType="mainSeq"/>
+              <p:prevCondLst>
+                <p:cond delay="0" evt="onPrev">
+                  <p:tgtEl>
+                    <p:sldTgt/>
+                  </p:tgtEl>
+                </p:cond>
+              </p:prevCondLst>
+              <p:nextCondLst>
+                <p:cond delay="0" evt="onNext">
+                  <p:tgtEl>
+                    <p:sldTgt/>
+                  </p:tgtEl>
+                </p:cond>
+              </p:nextCondLst>
+            </p:seq>
+          </p:childTnLst>
+        </p:cTn>
+      </p:par>
+    </p:tnLst>
+  </p:timing>
+</p:sld>
+</file>
+
+<file path=ppt/slides/slide9.xml><?xml version="1.0" encoding="utf-8"?>
+<p:sld xmlns:a="http://schemas.openxmlformats.org/drawingml/2006/main" xmlns:p="http://schemas.openxmlformats.org/presentationml/2006/main" xmlns:r="http://schemas.openxmlformats.org/officeDocument/2006/relationships" xmlns:p14="http://schemas.microsoft.com/office/powerpoint/2010/main" xmlns:p15="http://schemas.microsoft.com/office/powerpoint/2012/main" xmlns:mc="http://schemas.openxmlformats.org/markup-compatibility/2006">
+  <p:cSld>
+    <p:spTree>
+      <p:nvGrpSpPr>
+        <p:cNvPr id="1" name=""/>
+        <p:cNvGrpSpPr/>
+        <p:nvPr/>
+      </p:nvGrpSpPr>
+      <p:grpSpPr>
+        <a:xfrm>
+          <a:off x="0" y="0"/>
+          <a:ext cx="0" cy="0"/>
+          <a:chOff x="0" y="0"/>
+          <a:chExt cx="0" cy="0"/>
+        </a:xfrm>
+      </p:grpSpPr>
+      <p:pic>
+        <p:nvPicPr>
+          <p:cNvPr id="87" name="Google Shape;178;p13" descr=""/>
+          <p:cNvPicPr/>
+          <p:nvPr/>
+        </p:nvPicPr>
+        <p:blipFill>
+          <a:blip r:embed="rId1"/>
+          <a:stretch/>
+        </p:blipFill>
+        <p:spPr>
+          <a:xfrm>
+            <a:off x="2205000" y="1652760"/>
+            <a:ext cx="4732920" cy="3551760"/>
+          </a:xfrm>
+          <a:prstGeom prst="rect">
+            <a:avLst/>
+          </a:prstGeom>
+          <a:ln>
+            <a:noFill/>
+          </a:ln>
+        </p:spPr>
+      </p:pic>
+    </p:spTree>
+  </p:cSld>
+  <p:timing>
+    <p:tnLst>
+      <p:par>
+        <p:cTn id="17" dur="indefinite" restart="never" nodeType="tmRoot">
+          <p:childTnLst>
+            <p:seq>
+              <p:cTn id="18" nodeType="mainSeq"/>
               <p:prevCondLst>
                 <p:cond delay="0" evt="onPrev">
                   <p:tgtEl>

</xml_diff>